<commit_message>
Added metrics and regression
</commit_message>
<xml_diff>
--- a/Машинное обучение.pptx
+++ b/Машинное обучение.pptx
@@ -5,7 +5,7 @@
     <p:sldMasterId id="2147483648" r:id="rId1"/>
   </p:sldMasterIdLst>
   <p:notesMasterIdLst>
-    <p:notesMasterId r:id="rId30"/>
+    <p:notesMasterId r:id="rId45"/>
   </p:notesMasterIdLst>
   <p:sldIdLst>
     <p:sldId id="256" r:id="rId2"/>
@@ -36,6 +36,21 @@
     <p:sldId id="280" r:id="rId27"/>
     <p:sldId id="284" r:id="rId28"/>
     <p:sldId id="281" r:id="rId29"/>
+    <p:sldId id="286" r:id="rId30"/>
+    <p:sldId id="287" r:id="rId31"/>
+    <p:sldId id="285" r:id="rId32"/>
+    <p:sldId id="288" r:id="rId33"/>
+    <p:sldId id="289" r:id="rId34"/>
+    <p:sldId id="290" r:id="rId35"/>
+    <p:sldId id="293" r:id="rId36"/>
+    <p:sldId id="292" r:id="rId37"/>
+    <p:sldId id="294" r:id="rId38"/>
+    <p:sldId id="291" r:id="rId39"/>
+    <p:sldId id="295" r:id="rId40"/>
+    <p:sldId id="296" r:id="rId41"/>
+    <p:sldId id="298" r:id="rId42"/>
+    <p:sldId id="297" r:id="rId43"/>
+    <p:sldId id="299" r:id="rId44"/>
   </p:sldIdLst>
   <p:sldSz cx="12192000" cy="6858000"/>
   <p:notesSz cx="6858000" cy="9144000"/>
@@ -224,7 +239,7 @@
           <a:p>
             <a:fld id="{D58D11A5-28FA-4FFF-A505-25C1FDB759A0}" type="datetimeFigureOut">
               <a:rPr lang="ru-RU" smtClean="0"/>
-              <a:t>05.09.2022</a:t>
+              <a:t>19.09.2022</a:t>
             </a:fld>
             <a:endParaRPr lang="ru-RU"/>
           </a:p>
@@ -638,7 +653,7 @@
           <a:p>
             <a:fld id="{0CA0BF5E-9C4D-4853-9F6E-0BD5C1F81E3A}" type="datetime1">
               <a:rPr lang="ru-RU" smtClean="0"/>
-              <a:t>05.09.2022</a:t>
+              <a:t>19.09.2022</a:t>
             </a:fld>
             <a:endParaRPr lang="ru-RU"/>
           </a:p>
@@ -836,7 +851,7 @@
           <a:p>
             <a:fld id="{5144D4BE-6C5C-4CC1-B36C-29084F4E9572}" type="datetime1">
               <a:rPr lang="ru-RU" smtClean="0"/>
-              <a:t>05.09.2022</a:t>
+              <a:t>19.09.2022</a:t>
             </a:fld>
             <a:endParaRPr lang="ru-RU"/>
           </a:p>
@@ -1044,7 +1059,7 @@
           <a:p>
             <a:fld id="{93828F6C-8163-48D7-B02F-7E9BBD58E787}" type="datetime1">
               <a:rPr lang="ru-RU" smtClean="0"/>
-              <a:t>05.09.2022</a:t>
+              <a:t>19.09.2022</a:t>
             </a:fld>
             <a:endParaRPr lang="ru-RU"/>
           </a:p>
@@ -1242,7 +1257,7 @@
           <a:p>
             <a:fld id="{C27911A3-C7EA-4B9D-A268-A890DA238FEC}" type="datetime1">
               <a:rPr lang="ru-RU" smtClean="0"/>
-              <a:t>05.09.2022</a:t>
+              <a:t>19.09.2022</a:t>
             </a:fld>
             <a:endParaRPr lang="ru-RU"/>
           </a:p>
@@ -1517,7 +1532,7 @@
           <a:p>
             <a:fld id="{FFE14E21-F7A4-467F-8C00-81CBE82FA656}" type="datetime1">
               <a:rPr lang="ru-RU" smtClean="0"/>
-              <a:t>05.09.2022</a:t>
+              <a:t>19.09.2022</a:t>
             </a:fld>
             <a:endParaRPr lang="ru-RU"/>
           </a:p>
@@ -1782,7 +1797,7 @@
           <a:p>
             <a:fld id="{D8063CCE-7E0D-426E-8EF0-F499A4893903}" type="datetime1">
               <a:rPr lang="ru-RU" smtClean="0"/>
-              <a:t>05.09.2022</a:t>
+              <a:t>19.09.2022</a:t>
             </a:fld>
             <a:endParaRPr lang="ru-RU"/>
           </a:p>
@@ -2194,7 +2209,7 @@
           <a:p>
             <a:fld id="{7CDCB65F-5022-4F61-94B9-BF5DC6132D3B}" type="datetime1">
               <a:rPr lang="ru-RU" smtClean="0"/>
-              <a:t>05.09.2022</a:t>
+              <a:t>19.09.2022</a:t>
             </a:fld>
             <a:endParaRPr lang="ru-RU"/>
           </a:p>
@@ -2335,7 +2350,7 @@
           <a:p>
             <a:fld id="{C275B450-0520-4817-BF2C-69E50E4B2591}" type="datetime1">
               <a:rPr lang="ru-RU" smtClean="0"/>
-              <a:t>05.09.2022</a:t>
+              <a:t>19.09.2022</a:t>
             </a:fld>
             <a:endParaRPr lang="ru-RU"/>
           </a:p>
@@ -2448,7 +2463,7 @@
           <a:p>
             <a:fld id="{946368BC-CA6C-4BF7-A30A-2CB8DB55F426}" type="datetime1">
               <a:rPr lang="ru-RU" smtClean="0"/>
-              <a:t>05.09.2022</a:t>
+              <a:t>19.09.2022</a:t>
             </a:fld>
             <a:endParaRPr lang="ru-RU"/>
           </a:p>
@@ -2759,7 +2774,7 @@
           <a:p>
             <a:fld id="{B90AD4BF-2206-475A-A97D-424DC4BAF6F9}" type="datetime1">
               <a:rPr lang="ru-RU" smtClean="0"/>
-              <a:t>05.09.2022</a:t>
+              <a:t>19.09.2022</a:t>
             </a:fld>
             <a:endParaRPr lang="ru-RU"/>
           </a:p>
@@ -3047,7 +3062,7 @@
           <a:p>
             <a:fld id="{64037B9B-C2A5-4E1A-A84A-FDCED43316CA}" type="datetime1">
               <a:rPr lang="ru-RU" smtClean="0"/>
-              <a:t>05.09.2022</a:t>
+              <a:t>19.09.2022</a:t>
             </a:fld>
             <a:endParaRPr lang="ru-RU"/>
           </a:p>
@@ -3288,7 +3303,7 @@
           <a:p>
             <a:fld id="{107B909C-02E5-4FD1-8654-6F0617C85795}" type="datetime1">
               <a:rPr lang="ru-RU" smtClean="0"/>
-              <a:t>05.09.2022</a:t>
+              <a:t>19.09.2022</a:t>
             </a:fld>
             <a:endParaRPr lang="ru-RU"/>
           </a:p>
@@ -7313,6 +7328,118 @@
 </p:sld>
 </file>
 
+<file path=ppt/slides/slide29.xml><?xml version="1.0" encoding="utf-8"?>
+<p:sld xmlns:a="http://schemas.openxmlformats.org/drawingml/2006/main" xmlns:r="http://schemas.openxmlformats.org/officeDocument/2006/relationships" xmlns:p="http://schemas.openxmlformats.org/presentationml/2006/main">
+  <p:cSld>
+    <p:spTree>
+      <p:nvGrpSpPr>
+        <p:cNvPr id="1" name=""/>
+        <p:cNvGrpSpPr/>
+        <p:nvPr/>
+      </p:nvGrpSpPr>
+      <p:grpSpPr>
+        <a:xfrm>
+          <a:off x="0" y="0"/>
+          <a:ext cx="0" cy="0"/>
+          <a:chOff x="0" y="0"/>
+          <a:chExt cx="0" cy="0"/>
+        </a:xfrm>
+      </p:grpSpPr>
+      <p:sp>
+        <p:nvSpPr>
+          <p:cNvPr id="5" name="Заголовок 4">
+            <a:extLst>
+              <a:ext uri="{FF2B5EF4-FFF2-40B4-BE49-F238E27FC236}">
+                <a16:creationId xmlns:a16="http://schemas.microsoft.com/office/drawing/2014/main" id="{439B554A-85D4-93CD-360C-5C9224060B83}"/>
+              </a:ext>
+            </a:extLst>
+          </p:cNvPr>
+          <p:cNvSpPr>
+            <a:spLocks noGrp="1"/>
+          </p:cNvSpPr>
+          <p:nvPr>
+            <p:ph type="ctrTitle"/>
+          </p:nvPr>
+        </p:nvSpPr>
+        <p:spPr/>
+        <p:txBody>
+          <a:bodyPr/>
+          <a:lstStyle/>
+          <a:p>
+            <a:r>
+              <a:rPr lang="ru-RU" dirty="0"/>
+              <a:t>Классическое обучение</a:t>
+            </a:r>
+          </a:p>
+        </p:txBody>
+      </p:sp>
+      <p:sp>
+        <p:nvSpPr>
+          <p:cNvPr id="6" name="Подзаголовок 5">
+            <a:extLst>
+              <a:ext uri="{FF2B5EF4-FFF2-40B4-BE49-F238E27FC236}">
+                <a16:creationId xmlns:a16="http://schemas.microsoft.com/office/drawing/2014/main" id="{545614A6-85B2-7E03-81BC-31846C3FE3AC}"/>
+              </a:ext>
+            </a:extLst>
+          </p:cNvPr>
+          <p:cNvSpPr>
+            <a:spLocks noGrp="1"/>
+          </p:cNvSpPr>
+          <p:nvPr>
+            <p:ph type="subTitle" idx="1"/>
+          </p:nvPr>
+        </p:nvSpPr>
+        <p:spPr/>
+        <p:txBody>
+          <a:bodyPr/>
+          <a:lstStyle/>
+          <a:p>
+            <a:endParaRPr lang="ru-RU" dirty="0"/>
+          </a:p>
+        </p:txBody>
+      </p:sp>
+      <p:sp>
+        <p:nvSpPr>
+          <p:cNvPr id="4" name="Номер слайда 3">
+            <a:extLst>
+              <a:ext uri="{FF2B5EF4-FFF2-40B4-BE49-F238E27FC236}">
+                <a16:creationId xmlns:a16="http://schemas.microsoft.com/office/drawing/2014/main" id="{3D4E60B2-3E5C-4762-024C-4E2CF402E5B9}"/>
+              </a:ext>
+            </a:extLst>
+          </p:cNvPr>
+          <p:cNvSpPr>
+            <a:spLocks noGrp="1"/>
+          </p:cNvSpPr>
+          <p:nvPr>
+            <p:ph type="sldNum" sz="quarter" idx="12"/>
+          </p:nvPr>
+        </p:nvSpPr>
+        <p:spPr/>
+        <p:txBody>
+          <a:bodyPr/>
+          <a:lstStyle/>
+          <a:p>
+            <a:fld id="{4B5110E4-62BB-43ED-9C58-95D1B7998FA6}" type="slidenum">
+              <a:rPr lang="ru-RU" smtClean="0"/>
+              <a:t>29</a:t>
+            </a:fld>
+            <a:endParaRPr lang="ru-RU"/>
+          </a:p>
+        </p:txBody>
+      </p:sp>
+    </p:spTree>
+    <p:extLst>
+      <p:ext uri="{BB962C8B-B14F-4D97-AF65-F5344CB8AC3E}">
+        <p14:creationId xmlns:p14="http://schemas.microsoft.com/office/powerpoint/2010/main" val="4097870606"/>
+      </p:ext>
+    </p:extLst>
+  </p:cSld>
+  <p:clrMapOvr>
+    <a:masterClrMapping/>
+  </p:clrMapOvr>
+</p:sld>
+</file>
+
 <file path=ppt/slides/slide3.xml><?xml version="1.0" encoding="utf-8"?>
 <p:sld xmlns:a="http://schemas.openxmlformats.org/drawingml/2006/main" xmlns:r="http://schemas.openxmlformats.org/officeDocument/2006/relationships" xmlns:p="http://schemas.openxmlformats.org/presentationml/2006/main">
   <p:cSld>
@@ -7428,6 +7555,2319 @@
 </p:sld>
 </file>
 
+<file path=ppt/slides/slide30.xml><?xml version="1.0" encoding="utf-8"?>
+<p:sld xmlns:a="http://schemas.openxmlformats.org/drawingml/2006/main" xmlns:r="http://schemas.openxmlformats.org/officeDocument/2006/relationships" xmlns:p="http://schemas.openxmlformats.org/presentationml/2006/main">
+  <p:cSld>
+    <p:bg>
+      <p:bgPr>
+        <a:solidFill>
+          <a:schemeClr val="bg1"/>
+        </a:solidFill>
+        <a:effectLst/>
+      </p:bgPr>
+    </p:bg>
+    <p:spTree>
+      <p:nvGrpSpPr>
+        <p:cNvPr id="1" name=""/>
+        <p:cNvGrpSpPr/>
+        <p:nvPr/>
+      </p:nvGrpSpPr>
+      <p:grpSpPr>
+        <a:xfrm>
+          <a:off x="0" y="0"/>
+          <a:ext cx="0" cy="0"/>
+          <a:chOff x="0" y="0"/>
+          <a:chExt cx="0" cy="0"/>
+        </a:xfrm>
+      </p:grpSpPr>
+      <p:pic>
+        <p:nvPicPr>
+          <p:cNvPr id="1026" name="Picture 2">
+            <a:extLst>
+              <a:ext uri="{FF2B5EF4-FFF2-40B4-BE49-F238E27FC236}">
+                <a16:creationId xmlns:a16="http://schemas.microsoft.com/office/drawing/2014/main" id="{DB8BFFD8-201C-ED3B-9C61-D5DB4AE9E418}"/>
+              </a:ext>
+            </a:extLst>
+          </p:cNvPr>
+          <p:cNvPicPr>
+            <a:picLocks noGrp="1" noChangeAspect="1" noChangeArrowheads="1"/>
+          </p:cNvPicPr>
+          <p:nvPr>
+            <p:ph idx="1"/>
+          </p:nvPr>
+        </p:nvPicPr>
+        <p:blipFill>
+          <a:blip r:embed="rId2">
+            <a:extLst>
+              <a:ext uri="{28A0092B-C50C-407E-A947-70E740481C1C}">
+                <a14:useLocalDpi xmlns:a14="http://schemas.microsoft.com/office/drawing/2010/main" val="0"/>
+              </a:ext>
+            </a:extLst>
+          </a:blip>
+          <a:stretch>
+            <a:fillRect/>
+          </a:stretch>
+        </p:blipFill>
+        <p:spPr bwMode="auto">
+          <a:xfrm>
+            <a:off x="2536213" y="643466"/>
+            <a:ext cx="7119574" cy="5571067"/>
+          </a:xfrm>
+          <a:prstGeom prst="rect">
+            <a:avLst/>
+          </a:prstGeom>
+          <a:noFill/>
+          <a:extLst>
+            <a:ext uri="{909E8E84-426E-40DD-AFC4-6F175D3DCCD1}">
+              <a14:hiddenFill xmlns:a14="http://schemas.microsoft.com/office/drawing/2010/main">
+                <a:solidFill>
+                  <a:srgbClr val="FFFFFF"/>
+                </a:solidFill>
+              </a14:hiddenFill>
+            </a:ext>
+          </a:extLst>
+        </p:spPr>
+      </p:pic>
+      <p:sp>
+        <p:nvSpPr>
+          <p:cNvPr id="4" name="Номер слайда 3">
+            <a:extLst>
+              <a:ext uri="{FF2B5EF4-FFF2-40B4-BE49-F238E27FC236}">
+                <a16:creationId xmlns:a16="http://schemas.microsoft.com/office/drawing/2014/main" id="{D350482E-D51D-66CF-BAB0-FA81D4612FCE}"/>
+              </a:ext>
+            </a:extLst>
+          </p:cNvPr>
+          <p:cNvSpPr>
+            <a:spLocks noGrp="1"/>
+          </p:cNvSpPr>
+          <p:nvPr>
+            <p:ph type="sldNum" sz="quarter" idx="12"/>
+          </p:nvPr>
+        </p:nvSpPr>
+        <p:spPr>
+          <a:xfrm>
+            <a:off x="8610600" y="6356350"/>
+            <a:ext cx="2743200" cy="365125"/>
+          </a:xfrm>
+        </p:spPr>
+        <p:txBody>
+          <a:bodyPr vert="horz" lIns="91440" tIns="45720" rIns="91440" bIns="45720" rtlCol="0" anchor="ctr">
+            <a:normAutofit/>
+          </a:bodyPr>
+          <a:lstStyle/>
+          <a:p>
+            <a:pPr>
+              <a:spcAft>
+                <a:spcPts val="600"/>
+              </a:spcAft>
+            </a:pPr>
+            <a:fld id="{4B5110E4-62BB-43ED-9C58-95D1B7998FA6}" type="slidenum">
+              <a:rPr lang="en-US" smtClean="0"/>
+              <a:pPr>
+                <a:spcAft>
+                  <a:spcPts val="600"/>
+                </a:spcAft>
+              </a:pPr>
+              <a:t>30</a:t>
+            </a:fld>
+            <a:endParaRPr lang="en-US"/>
+          </a:p>
+        </p:txBody>
+      </p:sp>
+    </p:spTree>
+    <p:extLst>
+      <p:ext uri="{BB962C8B-B14F-4D97-AF65-F5344CB8AC3E}">
+        <p14:creationId xmlns:p14="http://schemas.microsoft.com/office/powerpoint/2010/main" val="2995826900"/>
+      </p:ext>
+    </p:extLst>
+  </p:cSld>
+  <p:clrMapOvr>
+    <a:masterClrMapping/>
+  </p:clrMapOvr>
+</p:sld>
+</file>
+
+<file path=ppt/slides/slide31.xml><?xml version="1.0" encoding="utf-8"?>
+<p:sld xmlns:a="http://schemas.openxmlformats.org/drawingml/2006/main" xmlns:r="http://schemas.openxmlformats.org/officeDocument/2006/relationships" xmlns:p="http://schemas.openxmlformats.org/presentationml/2006/main">
+  <p:cSld>
+    <p:spTree>
+      <p:nvGrpSpPr>
+        <p:cNvPr id="1" name=""/>
+        <p:cNvGrpSpPr/>
+        <p:nvPr/>
+      </p:nvGrpSpPr>
+      <p:grpSpPr>
+        <a:xfrm>
+          <a:off x="0" y="0"/>
+          <a:ext cx="0" cy="0"/>
+          <a:chOff x="0" y="0"/>
+          <a:chExt cx="0" cy="0"/>
+        </a:xfrm>
+      </p:grpSpPr>
+      <p:sp>
+        <p:nvSpPr>
+          <p:cNvPr id="2" name="Заголовок 1">
+            <a:extLst>
+              <a:ext uri="{FF2B5EF4-FFF2-40B4-BE49-F238E27FC236}">
+                <a16:creationId xmlns:a16="http://schemas.microsoft.com/office/drawing/2014/main" id="{4B1DB9D4-35FC-ECA8-01D6-55CE6618FA9E}"/>
+              </a:ext>
+            </a:extLst>
+          </p:cNvPr>
+          <p:cNvSpPr>
+            <a:spLocks noGrp="1"/>
+          </p:cNvSpPr>
+          <p:nvPr>
+            <p:ph type="title"/>
+          </p:nvPr>
+        </p:nvSpPr>
+        <p:spPr/>
+        <p:txBody>
+          <a:bodyPr/>
+          <a:lstStyle/>
+          <a:p>
+            <a:r>
+              <a:rPr lang="ru-RU" dirty="0"/>
+              <a:t>Обучение с учителем</a:t>
+            </a:r>
+          </a:p>
+        </p:txBody>
+      </p:sp>
+      <p:sp>
+        <p:nvSpPr>
+          <p:cNvPr id="3" name="Объект 2">
+            <a:extLst>
+              <a:ext uri="{FF2B5EF4-FFF2-40B4-BE49-F238E27FC236}">
+                <a16:creationId xmlns:a16="http://schemas.microsoft.com/office/drawing/2014/main" id="{01AE5237-DF93-FD4F-1940-00154381F1EF}"/>
+              </a:ext>
+            </a:extLst>
+          </p:cNvPr>
+          <p:cNvSpPr>
+            <a:spLocks noGrp="1"/>
+          </p:cNvSpPr>
+          <p:nvPr>
+            <p:ph idx="1"/>
+          </p:nvPr>
+        </p:nvSpPr>
+        <p:spPr>
+          <a:xfrm>
+            <a:off x="4416356" y="1825625"/>
+            <a:ext cx="6937443" cy="4351338"/>
+          </a:xfrm>
+        </p:spPr>
+        <p:txBody>
+          <a:bodyPr/>
+          <a:lstStyle/>
+          <a:p>
+            <a:r>
+              <a:rPr lang="ru-RU" dirty="0">
+                <a:latin typeface="-apple-system"/>
+              </a:rPr>
+              <a:t>у машины есть некий учитель, который говорит ей как правильно. Рассказывает, что на этой картинке кошка, а на этой собака. То есть учитель уже заранее разделил (разметил) все данные на кошек и собак, а машина учится на конкретных примерах.</a:t>
+            </a:r>
+          </a:p>
+        </p:txBody>
+      </p:sp>
+      <p:sp>
+        <p:nvSpPr>
+          <p:cNvPr id="4" name="Номер слайда 3">
+            <a:extLst>
+              <a:ext uri="{FF2B5EF4-FFF2-40B4-BE49-F238E27FC236}">
+                <a16:creationId xmlns:a16="http://schemas.microsoft.com/office/drawing/2014/main" id="{EB5D1772-1C8C-2E7E-E127-0E299C89C039}"/>
+              </a:ext>
+            </a:extLst>
+          </p:cNvPr>
+          <p:cNvSpPr>
+            <a:spLocks noGrp="1"/>
+          </p:cNvSpPr>
+          <p:nvPr>
+            <p:ph type="sldNum" sz="quarter" idx="12"/>
+          </p:nvPr>
+        </p:nvSpPr>
+        <p:spPr/>
+        <p:txBody>
+          <a:bodyPr/>
+          <a:lstStyle/>
+          <a:p>
+            <a:fld id="{4B5110E4-62BB-43ED-9C58-95D1B7998FA6}" type="slidenum">
+              <a:rPr lang="ru-RU" smtClean="0"/>
+              <a:t>31</a:t>
+            </a:fld>
+            <a:endParaRPr lang="ru-RU"/>
+          </a:p>
+        </p:txBody>
+      </p:sp>
+      <p:pic>
+        <p:nvPicPr>
+          <p:cNvPr id="2052" name="Picture 4" descr="Стикер ВК Учебные будни #19">
+            <a:extLst>
+              <a:ext uri="{FF2B5EF4-FFF2-40B4-BE49-F238E27FC236}">
+                <a16:creationId xmlns:a16="http://schemas.microsoft.com/office/drawing/2014/main" id="{F90CD772-107B-1569-DD7C-E5427E2697E1}"/>
+              </a:ext>
+            </a:extLst>
+          </p:cNvPr>
+          <p:cNvPicPr>
+            <a:picLocks noChangeAspect="1" noChangeArrowheads="1"/>
+          </p:cNvPicPr>
+          <p:nvPr/>
+        </p:nvPicPr>
+        <p:blipFill>
+          <a:blip r:embed="rId2">
+            <a:extLst>
+              <a:ext uri="{28A0092B-C50C-407E-A947-70E740481C1C}">
+                <a14:useLocalDpi xmlns:a14="http://schemas.microsoft.com/office/drawing/2010/main" val="0"/>
+              </a:ext>
+            </a:extLst>
+          </a:blip>
+          <a:srcRect/>
+          <a:stretch>
+            <a:fillRect/>
+          </a:stretch>
+        </p:blipFill>
+        <p:spPr bwMode="auto">
+          <a:xfrm>
+            <a:off x="431960" y="2370137"/>
+            <a:ext cx="4351338" cy="4351338"/>
+          </a:xfrm>
+          <a:prstGeom prst="rect">
+            <a:avLst/>
+          </a:prstGeom>
+          <a:noFill/>
+          <a:extLst>
+            <a:ext uri="{909E8E84-426E-40DD-AFC4-6F175D3DCCD1}">
+              <a14:hiddenFill xmlns:a14="http://schemas.microsoft.com/office/drawing/2010/main">
+                <a:solidFill>
+                  <a:srgbClr val="FFFFFF"/>
+                </a:solidFill>
+              </a14:hiddenFill>
+            </a:ext>
+          </a:extLst>
+        </p:spPr>
+      </p:pic>
+    </p:spTree>
+    <p:extLst>
+      <p:ext uri="{BB962C8B-B14F-4D97-AF65-F5344CB8AC3E}">
+        <p14:creationId xmlns:p14="http://schemas.microsoft.com/office/powerpoint/2010/main" val="1715561621"/>
+      </p:ext>
+    </p:extLst>
+  </p:cSld>
+  <p:clrMapOvr>
+    <a:masterClrMapping/>
+  </p:clrMapOvr>
+</p:sld>
+</file>
+
+<file path=ppt/slides/slide32.xml><?xml version="1.0" encoding="utf-8"?>
+<p:sld xmlns:a="http://schemas.openxmlformats.org/drawingml/2006/main" xmlns:r="http://schemas.openxmlformats.org/officeDocument/2006/relationships" xmlns:p="http://schemas.openxmlformats.org/presentationml/2006/main">
+  <p:cSld>
+    <p:spTree>
+      <p:nvGrpSpPr>
+        <p:cNvPr id="1" name=""/>
+        <p:cNvGrpSpPr/>
+        <p:nvPr/>
+      </p:nvGrpSpPr>
+      <p:grpSpPr>
+        <a:xfrm>
+          <a:off x="0" y="0"/>
+          <a:ext cx="0" cy="0"/>
+          <a:chOff x="0" y="0"/>
+          <a:chExt cx="0" cy="0"/>
+        </a:xfrm>
+      </p:grpSpPr>
+      <p:sp>
+        <p:nvSpPr>
+          <p:cNvPr id="2" name="Заголовок 1">
+            <a:extLst>
+              <a:ext uri="{FF2B5EF4-FFF2-40B4-BE49-F238E27FC236}">
+                <a16:creationId xmlns:a16="http://schemas.microsoft.com/office/drawing/2014/main" id="{51B016C0-6BD9-5FCB-9469-781CA6C384E0}"/>
+              </a:ext>
+            </a:extLst>
+          </p:cNvPr>
+          <p:cNvSpPr>
+            <a:spLocks noGrp="1"/>
+          </p:cNvSpPr>
+          <p:nvPr>
+            <p:ph type="title"/>
+          </p:nvPr>
+        </p:nvSpPr>
+        <p:spPr/>
+        <p:txBody>
+          <a:bodyPr/>
+          <a:lstStyle/>
+          <a:p>
+            <a:r>
+              <a:rPr lang="ru-RU" dirty="0"/>
+              <a:t>Обучение без учителя</a:t>
+            </a:r>
+          </a:p>
+        </p:txBody>
+      </p:sp>
+      <p:sp>
+        <p:nvSpPr>
+          <p:cNvPr id="3" name="Объект 2">
+            <a:extLst>
+              <a:ext uri="{FF2B5EF4-FFF2-40B4-BE49-F238E27FC236}">
+                <a16:creationId xmlns:a16="http://schemas.microsoft.com/office/drawing/2014/main" id="{92A64225-0AF6-9DBD-AB0C-8E30E2D1C71F}"/>
+              </a:ext>
+            </a:extLst>
+          </p:cNvPr>
+          <p:cNvSpPr>
+            <a:spLocks noGrp="1"/>
+          </p:cNvSpPr>
+          <p:nvPr>
+            <p:ph idx="1"/>
+          </p:nvPr>
+        </p:nvSpPr>
+        <p:spPr>
+          <a:xfrm>
+            <a:off x="838200" y="1825625"/>
+            <a:ext cx="6457545" cy="4351338"/>
+          </a:xfrm>
+        </p:spPr>
+        <p:txBody>
+          <a:bodyPr/>
+          <a:lstStyle/>
+          <a:p>
+            <a:r>
+              <a:rPr lang="ru-RU" dirty="0"/>
+              <a:t>В обучении без учителя, машине просто вываливают кучу фотографий животных на стол и говорят «разберись, кто здесь на кого похож». Данные не размечены, у машины нет учителя, и она пытается сама найти любые закономерности.</a:t>
+            </a:r>
+          </a:p>
+        </p:txBody>
+      </p:sp>
+      <p:sp>
+        <p:nvSpPr>
+          <p:cNvPr id="4" name="Номер слайда 3">
+            <a:extLst>
+              <a:ext uri="{FF2B5EF4-FFF2-40B4-BE49-F238E27FC236}">
+                <a16:creationId xmlns:a16="http://schemas.microsoft.com/office/drawing/2014/main" id="{1C6E182E-9BAE-62B9-8E59-8BA3EA3C8FCD}"/>
+              </a:ext>
+            </a:extLst>
+          </p:cNvPr>
+          <p:cNvSpPr>
+            <a:spLocks noGrp="1"/>
+          </p:cNvSpPr>
+          <p:nvPr>
+            <p:ph type="sldNum" sz="quarter" idx="12"/>
+          </p:nvPr>
+        </p:nvSpPr>
+        <p:spPr/>
+        <p:txBody>
+          <a:bodyPr/>
+          <a:lstStyle/>
+          <a:p>
+            <a:fld id="{4B5110E4-62BB-43ED-9C58-95D1B7998FA6}" type="slidenum">
+              <a:rPr lang="ru-RU" smtClean="0"/>
+              <a:t>32</a:t>
+            </a:fld>
+            <a:endParaRPr lang="ru-RU"/>
+          </a:p>
+        </p:txBody>
+      </p:sp>
+      <p:pic>
+        <p:nvPicPr>
+          <p:cNvPr id="3074" name="Picture 2" descr="Стикер ВК Миу-Мяу #13">
+            <a:extLst>
+              <a:ext uri="{FF2B5EF4-FFF2-40B4-BE49-F238E27FC236}">
+                <a16:creationId xmlns:a16="http://schemas.microsoft.com/office/drawing/2014/main" id="{502AB3F9-6444-C888-2112-715AC2753C99}"/>
+              </a:ext>
+            </a:extLst>
+          </p:cNvPr>
+          <p:cNvPicPr>
+            <a:picLocks noChangeAspect="1" noChangeArrowheads="1"/>
+          </p:cNvPicPr>
+          <p:nvPr/>
+        </p:nvPicPr>
+        <p:blipFill>
+          <a:blip r:embed="rId2">
+            <a:extLst>
+              <a:ext uri="{28A0092B-C50C-407E-A947-70E740481C1C}">
+                <a14:useLocalDpi xmlns:a14="http://schemas.microsoft.com/office/drawing/2010/main" val="0"/>
+              </a:ext>
+            </a:extLst>
+          </a:blip>
+          <a:srcRect/>
+          <a:stretch>
+            <a:fillRect/>
+          </a:stretch>
+        </p:blipFill>
+        <p:spPr bwMode="auto">
+          <a:xfrm>
+            <a:off x="7208196" y="1616075"/>
+            <a:ext cx="4876800" cy="4876800"/>
+          </a:xfrm>
+          <a:prstGeom prst="rect">
+            <a:avLst/>
+          </a:prstGeom>
+          <a:noFill/>
+          <a:extLst>
+            <a:ext uri="{909E8E84-426E-40DD-AFC4-6F175D3DCCD1}">
+              <a14:hiddenFill xmlns:a14="http://schemas.microsoft.com/office/drawing/2010/main">
+                <a:solidFill>
+                  <a:srgbClr val="FFFFFF"/>
+                </a:solidFill>
+              </a14:hiddenFill>
+            </a:ext>
+          </a:extLst>
+        </p:spPr>
+      </p:pic>
+    </p:spTree>
+    <p:extLst>
+      <p:ext uri="{BB962C8B-B14F-4D97-AF65-F5344CB8AC3E}">
+        <p14:creationId xmlns:p14="http://schemas.microsoft.com/office/powerpoint/2010/main" val="1554574304"/>
+      </p:ext>
+    </p:extLst>
+  </p:cSld>
+  <p:clrMapOvr>
+    <a:masterClrMapping/>
+  </p:clrMapOvr>
+</p:sld>
+</file>
+
+<file path=ppt/slides/slide33.xml><?xml version="1.0" encoding="utf-8"?>
+<p:sld xmlns:a="http://schemas.openxmlformats.org/drawingml/2006/main" xmlns:r="http://schemas.openxmlformats.org/officeDocument/2006/relationships" xmlns:p="http://schemas.openxmlformats.org/presentationml/2006/main">
+  <p:cSld>
+    <p:spTree>
+      <p:nvGrpSpPr>
+        <p:cNvPr id="1" name=""/>
+        <p:cNvGrpSpPr/>
+        <p:nvPr/>
+      </p:nvGrpSpPr>
+      <p:grpSpPr>
+        <a:xfrm>
+          <a:off x="0" y="0"/>
+          <a:ext cx="0" cy="0"/>
+          <a:chOff x="0" y="0"/>
+          <a:chExt cx="0" cy="0"/>
+        </a:xfrm>
+      </p:grpSpPr>
+      <p:sp>
+        <p:nvSpPr>
+          <p:cNvPr id="2" name="Заголовок 1">
+            <a:extLst>
+              <a:ext uri="{FF2B5EF4-FFF2-40B4-BE49-F238E27FC236}">
+                <a16:creationId xmlns:a16="http://schemas.microsoft.com/office/drawing/2014/main" id="{93F2FEA9-84D1-7732-5B33-5DEB76EDE039}"/>
+              </a:ext>
+            </a:extLst>
+          </p:cNvPr>
+          <p:cNvSpPr>
+            <a:spLocks noGrp="1"/>
+          </p:cNvSpPr>
+          <p:nvPr>
+            <p:ph type="title"/>
+          </p:nvPr>
+        </p:nvSpPr>
+        <p:spPr/>
+        <p:txBody>
+          <a:bodyPr/>
+          <a:lstStyle/>
+          <a:p>
+            <a:r>
+              <a:rPr lang="ru-RU" dirty="0"/>
+              <a:t>Регрессия</a:t>
+            </a:r>
+          </a:p>
+        </p:txBody>
+      </p:sp>
+      <p:sp>
+        <p:nvSpPr>
+          <p:cNvPr id="3" name="Объект 2">
+            <a:extLst>
+              <a:ext uri="{FF2B5EF4-FFF2-40B4-BE49-F238E27FC236}">
+                <a16:creationId xmlns:a16="http://schemas.microsoft.com/office/drawing/2014/main" id="{368421F6-B119-7D70-1867-0E27266A1403}"/>
+              </a:ext>
+            </a:extLst>
+          </p:cNvPr>
+          <p:cNvSpPr>
+            <a:spLocks noGrp="1"/>
+          </p:cNvSpPr>
+          <p:nvPr>
+            <p:ph idx="1"/>
+          </p:nvPr>
+        </p:nvSpPr>
+        <p:spPr/>
+        <p:txBody>
+          <a:bodyPr/>
+          <a:lstStyle/>
+          <a:p>
+            <a:pPr marL="0" indent="0">
+              <a:buNone/>
+            </a:pPr>
+            <a:r>
+              <a:rPr lang="ru-RU" i="1" dirty="0"/>
+              <a:t>«Нарисуй линию вдоль моих точек. Да, это машинное обучение»</a:t>
+            </a:r>
+          </a:p>
+        </p:txBody>
+      </p:sp>
+      <p:sp>
+        <p:nvSpPr>
+          <p:cNvPr id="4" name="Номер слайда 3">
+            <a:extLst>
+              <a:ext uri="{FF2B5EF4-FFF2-40B4-BE49-F238E27FC236}">
+                <a16:creationId xmlns:a16="http://schemas.microsoft.com/office/drawing/2014/main" id="{C588D520-9042-30DE-8A79-A78D036F1739}"/>
+              </a:ext>
+            </a:extLst>
+          </p:cNvPr>
+          <p:cNvSpPr>
+            <a:spLocks noGrp="1"/>
+          </p:cNvSpPr>
+          <p:nvPr>
+            <p:ph type="sldNum" sz="quarter" idx="12"/>
+          </p:nvPr>
+        </p:nvSpPr>
+        <p:spPr/>
+        <p:txBody>
+          <a:bodyPr/>
+          <a:lstStyle/>
+          <a:p>
+            <a:fld id="{4B5110E4-62BB-43ED-9C58-95D1B7998FA6}" type="slidenum">
+              <a:rPr lang="ru-RU" smtClean="0"/>
+              <a:t>33</a:t>
+            </a:fld>
+            <a:endParaRPr lang="ru-RU"/>
+          </a:p>
+        </p:txBody>
+      </p:sp>
+      <p:pic>
+        <p:nvPicPr>
+          <p:cNvPr id="4098" name="Picture 2">
+            <a:extLst>
+              <a:ext uri="{FF2B5EF4-FFF2-40B4-BE49-F238E27FC236}">
+                <a16:creationId xmlns:a16="http://schemas.microsoft.com/office/drawing/2014/main" id="{429A0A91-0824-A699-6887-4CA223B03719}"/>
+              </a:ext>
+            </a:extLst>
+          </p:cNvPr>
+          <p:cNvPicPr>
+            <a:picLocks noChangeAspect="1" noChangeArrowheads="1"/>
+          </p:cNvPicPr>
+          <p:nvPr/>
+        </p:nvPicPr>
+        <p:blipFill>
+          <a:blip r:embed="rId2">
+            <a:extLst>
+              <a:ext uri="{28A0092B-C50C-407E-A947-70E740481C1C}">
+                <a14:useLocalDpi xmlns:a14="http://schemas.microsoft.com/office/drawing/2010/main" val="0"/>
+              </a:ext>
+            </a:extLst>
+          </a:blip>
+          <a:srcRect/>
+          <a:stretch>
+            <a:fillRect/>
+          </a:stretch>
+        </p:blipFill>
+        <p:spPr bwMode="auto">
+          <a:xfrm>
+            <a:off x="573057" y="2757791"/>
+            <a:ext cx="3735084" cy="3735084"/>
+          </a:xfrm>
+          <a:prstGeom prst="rect">
+            <a:avLst/>
+          </a:prstGeom>
+          <a:noFill/>
+          <a:extLst>
+            <a:ext uri="{909E8E84-426E-40DD-AFC4-6F175D3DCCD1}">
+              <a14:hiddenFill xmlns:a14="http://schemas.microsoft.com/office/drawing/2010/main">
+                <a:solidFill>
+                  <a:srgbClr val="FFFFFF"/>
+                </a:solidFill>
+              </a14:hiddenFill>
+            </a:ext>
+          </a:extLst>
+        </p:spPr>
+      </p:pic>
+      <p:sp>
+        <p:nvSpPr>
+          <p:cNvPr id="5" name="TextBox 4">
+            <a:extLst>
+              <a:ext uri="{FF2B5EF4-FFF2-40B4-BE49-F238E27FC236}">
+                <a16:creationId xmlns:a16="http://schemas.microsoft.com/office/drawing/2014/main" id="{0A516D74-4ED6-3B0E-ABD9-469F9A7416C3}"/>
+              </a:ext>
+            </a:extLst>
+          </p:cNvPr>
+          <p:cNvSpPr txBox="1"/>
+          <p:nvPr/>
+        </p:nvSpPr>
+        <p:spPr>
+          <a:xfrm>
+            <a:off x="4408527" y="2757791"/>
+            <a:ext cx="4751948" cy="1754326"/>
+          </a:xfrm>
+          <a:prstGeom prst="rect">
+            <a:avLst/>
+          </a:prstGeom>
+          <a:noFill/>
+        </p:spPr>
+        <p:txBody>
+          <a:bodyPr wrap="square" rtlCol="0">
+            <a:spAutoFit/>
+          </a:bodyPr>
+          <a:lstStyle/>
+          <a:p>
+            <a:r>
+              <a:rPr lang="ru-RU" b="0" i="0" dirty="0">
+                <a:effectLst/>
+                <a:latin typeface="+mj-lt"/>
+              </a:rPr>
+              <a:t>Сегодня используют для:</a:t>
+            </a:r>
+          </a:p>
+          <a:p>
+            <a:endParaRPr lang="ru-RU" b="0" i="0" dirty="0">
+              <a:effectLst/>
+              <a:latin typeface="+mj-lt"/>
+            </a:endParaRPr>
+          </a:p>
+          <a:p>
+            <a:pPr marL="285750" indent="-285750">
+              <a:buFont typeface="Arial" panose="020B0604020202020204" pitchFamily="34" charset="0"/>
+              <a:buChar char="•"/>
+            </a:pPr>
+            <a:r>
+              <a:rPr lang="ru-RU" b="0" i="0" dirty="0">
+                <a:effectLst/>
+                <a:latin typeface="+mj-lt"/>
+              </a:rPr>
+              <a:t>Прогноз стоимости ценных бумаг</a:t>
+            </a:r>
+          </a:p>
+          <a:p>
+            <a:pPr marL="285750" indent="-285750">
+              <a:buFont typeface="Arial" panose="020B0604020202020204" pitchFamily="34" charset="0"/>
+              <a:buChar char="•"/>
+            </a:pPr>
+            <a:r>
+              <a:rPr lang="ru-RU" b="0" i="0" dirty="0">
+                <a:effectLst/>
+                <a:latin typeface="+mj-lt"/>
+              </a:rPr>
+              <a:t>Анализ спроса, объема продаж</a:t>
+            </a:r>
+          </a:p>
+          <a:p>
+            <a:pPr marL="285750" indent="-285750">
+              <a:buFont typeface="Arial" panose="020B0604020202020204" pitchFamily="34" charset="0"/>
+              <a:buChar char="•"/>
+            </a:pPr>
+            <a:r>
+              <a:rPr lang="ru-RU" b="0" i="0" dirty="0">
+                <a:effectLst/>
+                <a:latin typeface="+mj-lt"/>
+              </a:rPr>
+              <a:t>Медицинские диагнозы</a:t>
+            </a:r>
+          </a:p>
+          <a:p>
+            <a:pPr marL="285750" indent="-285750">
+              <a:buFont typeface="Arial" panose="020B0604020202020204" pitchFamily="34" charset="0"/>
+              <a:buChar char="•"/>
+            </a:pPr>
+            <a:r>
+              <a:rPr lang="ru-RU" b="0" i="0" dirty="0">
+                <a:effectLst/>
+                <a:latin typeface="+mj-lt"/>
+              </a:rPr>
+              <a:t>Любые зависимости числа от времени</a:t>
+            </a:r>
+            <a:endParaRPr lang="ru-RU" dirty="0">
+              <a:latin typeface="+mj-lt"/>
+            </a:endParaRPr>
+          </a:p>
+        </p:txBody>
+      </p:sp>
+    </p:spTree>
+    <p:extLst>
+      <p:ext uri="{BB962C8B-B14F-4D97-AF65-F5344CB8AC3E}">
+        <p14:creationId xmlns:p14="http://schemas.microsoft.com/office/powerpoint/2010/main" val="2782999234"/>
+      </p:ext>
+    </p:extLst>
+  </p:cSld>
+  <p:clrMapOvr>
+    <a:masterClrMapping/>
+  </p:clrMapOvr>
+</p:sld>
+</file>
+
+<file path=ppt/slides/slide34.xml><?xml version="1.0" encoding="utf-8"?>
+<p:sld xmlns:a="http://schemas.openxmlformats.org/drawingml/2006/main" xmlns:r="http://schemas.openxmlformats.org/officeDocument/2006/relationships" xmlns:p="http://schemas.openxmlformats.org/presentationml/2006/main">
+  <p:cSld>
+    <p:spTree>
+      <p:nvGrpSpPr>
+        <p:cNvPr id="1" name=""/>
+        <p:cNvGrpSpPr/>
+        <p:nvPr/>
+      </p:nvGrpSpPr>
+      <p:grpSpPr>
+        <a:xfrm>
+          <a:off x="0" y="0"/>
+          <a:ext cx="0" cy="0"/>
+          <a:chOff x="0" y="0"/>
+          <a:chExt cx="0" cy="0"/>
+        </a:xfrm>
+      </p:grpSpPr>
+      <p:sp>
+        <p:nvSpPr>
+          <p:cNvPr id="2" name="Заголовок 1">
+            <a:extLst>
+              <a:ext uri="{FF2B5EF4-FFF2-40B4-BE49-F238E27FC236}">
+                <a16:creationId xmlns:a16="http://schemas.microsoft.com/office/drawing/2014/main" id="{05ADD17B-B859-C8BD-7965-ED5A6DEDAB35}"/>
+              </a:ext>
+            </a:extLst>
+          </p:cNvPr>
+          <p:cNvSpPr>
+            <a:spLocks noGrp="1"/>
+          </p:cNvSpPr>
+          <p:nvPr>
+            <p:ph type="title"/>
+          </p:nvPr>
+        </p:nvSpPr>
+        <p:spPr/>
+        <p:txBody>
+          <a:bodyPr/>
+          <a:lstStyle/>
+          <a:p>
+            <a:r>
+              <a:rPr lang="ru-RU" dirty="0"/>
+              <a:t>Регрессия</a:t>
+            </a:r>
+          </a:p>
+        </p:txBody>
+      </p:sp>
+      <p:sp>
+        <p:nvSpPr>
+          <p:cNvPr id="4" name="Номер слайда 3">
+            <a:extLst>
+              <a:ext uri="{FF2B5EF4-FFF2-40B4-BE49-F238E27FC236}">
+                <a16:creationId xmlns:a16="http://schemas.microsoft.com/office/drawing/2014/main" id="{0E7313ED-30D4-9AE7-54F1-5F349835907D}"/>
+              </a:ext>
+            </a:extLst>
+          </p:cNvPr>
+          <p:cNvSpPr>
+            <a:spLocks noGrp="1"/>
+          </p:cNvSpPr>
+          <p:nvPr>
+            <p:ph type="sldNum" sz="quarter" idx="12"/>
+          </p:nvPr>
+        </p:nvSpPr>
+        <p:spPr/>
+        <p:txBody>
+          <a:bodyPr/>
+          <a:lstStyle/>
+          <a:p>
+            <a:fld id="{4B5110E4-62BB-43ED-9C58-95D1B7998FA6}" type="slidenum">
+              <a:rPr lang="ru-RU" smtClean="0"/>
+              <a:t>34</a:t>
+            </a:fld>
+            <a:endParaRPr lang="ru-RU"/>
+          </a:p>
+        </p:txBody>
+      </p:sp>
+      <p:pic>
+        <p:nvPicPr>
+          <p:cNvPr id="5122" name="Picture 2">
+            <a:extLst>
+              <a:ext uri="{FF2B5EF4-FFF2-40B4-BE49-F238E27FC236}">
+                <a16:creationId xmlns:a16="http://schemas.microsoft.com/office/drawing/2014/main" id="{02B00E01-C321-930C-73AA-44B983ECDB64}"/>
+              </a:ext>
+            </a:extLst>
+          </p:cNvPr>
+          <p:cNvPicPr>
+            <a:picLocks noGrp="1" noChangeAspect="1" noChangeArrowheads="1"/>
+          </p:cNvPicPr>
+          <p:nvPr>
+            <p:ph idx="1"/>
+          </p:nvPr>
+        </p:nvPicPr>
+        <p:blipFill>
+          <a:blip r:embed="rId2">
+            <a:extLst>
+              <a:ext uri="{28A0092B-C50C-407E-A947-70E740481C1C}">
+                <a14:useLocalDpi xmlns:a14="http://schemas.microsoft.com/office/drawing/2010/main" val="0"/>
+              </a:ext>
+            </a:extLst>
+          </a:blip>
+          <a:srcRect/>
+          <a:stretch>
+            <a:fillRect/>
+          </a:stretch>
+        </p:blipFill>
+        <p:spPr bwMode="auto">
+          <a:xfrm>
+            <a:off x="2315530" y="1825625"/>
+            <a:ext cx="7560939" cy="4351338"/>
+          </a:xfrm>
+          <a:prstGeom prst="rect">
+            <a:avLst/>
+          </a:prstGeom>
+          <a:noFill/>
+          <a:extLst>
+            <a:ext uri="{909E8E84-426E-40DD-AFC4-6F175D3DCCD1}">
+              <a14:hiddenFill xmlns:a14="http://schemas.microsoft.com/office/drawing/2010/main">
+                <a:solidFill>
+                  <a:srgbClr val="FFFFFF"/>
+                </a:solidFill>
+              </a14:hiddenFill>
+            </a:ext>
+          </a:extLst>
+        </p:spPr>
+      </p:pic>
+    </p:spTree>
+    <p:extLst>
+      <p:ext uri="{BB962C8B-B14F-4D97-AF65-F5344CB8AC3E}">
+        <p14:creationId xmlns:p14="http://schemas.microsoft.com/office/powerpoint/2010/main" val="3075729972"/>
+      </p:ext>
+    </p:extLst>
+  </p:cSld>
+  <p:clrMapOvr>
+    <a:masterClrMapping/>
+  </p:clrMapOvr>
+</p:sld>
+</file>
+
+<file path=ppt/slides/slide35.xml><?xml version="1.0" encoding="utf-8"?>
+<p:sld xmlns:a="http://schemas.openxmlformats.org/drawingml/2006/main" xmlns:r="http://schemas.openxmlformats.org/officeDocument/2006/relationships" xmlns:p="http://schemas.openxmlformats.org/presentationml/2006/main">
+  <p:cSld>
+    <p:spTree>
+      <p:nvGrpSpPr>
+        <p:cNvPr id="1" name=""/>
+        <p:cNvGrpSpPr/>
+        <p:nvPr/>
+      </p:nvGrpSpPr>
+      <p:grpSpPr>
+        <a:xfrm>
+          <a:off x="0" y="0"/>
+          <a:ext cx="0" cy="0"/>
+          <a:chOff x="0" y="0"/>
+          <a:chExt cx="0" cy="0"/>
+        </a:xfrm>
+      </p:grpSpPr>
+      <p:sp>
+        <p:nvSpPr>
+          <p:cNvPr id="2" name="Заголовок 1">
+            <a:extLst>
+              <a:ext uri="{FF2B5EF4-FFF2-40B4-BE49-F238E27FC236}">
+                <a16:creationId xmlns:a16="http://schemas.microsoft.com/office/drawing/2014/main" id="{AC4C9B86-A11F-D1FC-EB09-33E4C7D656D8}"/>
+              </a:ext>
+            </a:extLst>
+          </p:cNvPr>
+          <p:cNvSpPr>
+            <a:spLocks noGrp="1"/>
+          </p:cNvSpPr>
+          <p:nvPr>
+            <p:ph type="title"/>
+          </p:nvPr>
+        </p:nvSpPr>
+        <p:spPr/>
+        <p:txBody>
+          <a:bodyPr/>
+          <a:lstStyle/>
+          <a:p>
+            <a:r>
+              <a:rPr lang="ru-RU" dirty="0"/>
+              <a:t>Линейная регрессия</a:t>
+            </a:r>
+          </a:p>
+        </p:txBody>
+      </p:sp>
+      <p:sp>
+        <p:nvSpPr>
+          <p:cNvPr id="3" name="Объект 2">
+            <a:extLst>
+              <a:ext uri="{FF2B5EF4-FFF2-40B4-BE49-F238E27FC236}">
+                <a16:creationId xmlns:a16="http://schemas.microsoft.com/office/drawing/2014/main" id="{CCAF4A68-47EF-4AE8-0A0A-6622A679F9C5}"/>
+              </a:ext>
+            </a:extLst>
+          </p:cNvPr>
+          <p:cNvSpPr>
+            <a:spLocks noGrp="1"/>
+          </p:cNvSpPr>
+          <p:nvPr>
+            <p:ph idx="1"/>
+          </p:nvPr>
+        </p:nvSpPr>
+        <p:spPr/>
+        <p:txBody>
+          <a:bodyPr/>
+          <a:lstStyle/>
+          <a:p>
+            <a:r>
+              <a:rPr lang="ru-RU" dirty="0"/>
+              <a:t>модель зависимости переменной x от одной или нескольких других переменных (факторов, регрессоров, независимых переменных) с линейной функцией зависимости.</a:t>
+            </a:r>
+          </a:p>
+          <a:p>
+            <a:endParaRPr lang="ru-RU" dirty="0"/>
+          </a:p>
+        </p:txBody>
+      </p:sp>
+      <p:sp>
+        <p:nvSpPr>
+          <p:cNvPr id="4" name="Номер слайда 3">
+            <a:extLst>
+              <a:ext uri="{FF2B5EF4-FFF2-40B4-BE49-F238E27FC236}">
+                <a16:creationId xmlns:a16="http://schemas.microsoft.com/office/drawing/2014/main" id="{FA717184-976E-9B5D-6CB8-25C649BD8A79}"/>
+              </a:ext>
+            </a:extLst>
+          </p:cNvPr>
+          <p:cNvSpPr>
+            <a:spLocks noGrp="1"/>
+          </p:cNvSpPr>
+          <p:nvPr>
+            <p:ph type="sldNum" sz="quarter" idx="12"/>
+          </p:nvPr>
+        </p:nvSpPr>
+        <p:spPr/>
+        <p:txBody>
+          <a:bodyPr/>
+          <a:lstStyle/>
+          <a:p>
+            <a:fld id="{4B5110E4-62BB-43ED-9C58-95D1B7998FA6}" type="slidenum">
+              <a:rPr lang="ru-RU" smtClean="0"/>
+              <a:t>35</a:t>
+            </a:fld>
+            <a:endParaRPr lang="ru-RU"/>
+          </a:p>
+        </p:txBody>
+      </p:sp>
+    </p:spTree>
+    <p:extLst>
+      <p:ext uri="{BB962C8B-B14F-4D97-AF65-F5344CB8AC3E}">
+        <p14:creationId xmlns:p14="http://schemas.microsoft.com/office/powerpoint/2010/main" val="679043837"/>
+      </p:ext>
+    </p:extLst>
+  </p:cSld>
+  <p:clrMapOvr>
+    <a:masterClrMapping/>
+  </p:clrMapOvr>
+</p:sld>
+</file>
+
+<file path=ppt/slides/slide36.xml><?xml version="1.0" encoding="utf-8"?>
+<p:sld xmlns:a="http://schemas.openxmlformats.org/drawingml/2006/main" xmlns:r="http://schemas.openxmlformats.org/officeDocument/2006/relationships" xmlns:p="http://schemas.openxmlformats.org/presentationml/2006/main">
+  <p:cSld>
+    <p:spTree>
+      <p:nvGrpSpPr>
+        <p:cNvPr id="1" name=""/>
+        <p:cNvGrpSpPr/>
+        <p:nvPr/>
+      </p:nvGrpSpPr>
+      <p:grpSpPr>
+        <a:xfrm>
+          <a:off x="0" y="0"/>
+          <a:ext cx="0" cy="0"/>
+          <a:chOff x="0" y="0"/>
+          <a:chExt cx="0" cy="0"/>
+        </a:xfrm>
+      </p:grpSpPr>
+      <p:sp>
+        <p:nvSpPr>
+          <p:cNvPr id="2" name="Заголовок 1">
+            <a:extLst>
+              <a:ext uri="{FF2B5EF4-FFF2-40B4-BE49-F238E27FC236}">
+                <a16:creationId xmlns:a16="http://schemas.microsoft.com/office/drawing/2014/main" id="{459B4E52-5A9C-E13A-8682-2BA46CC4D527}"/>
+              </a:ext>
+            </a:extLst>
+          </p:cNvPr>
+          <p:cNvSpPr>
+            <a:spLocks noGrp="1"/>
+          </p:cNvSpPr>
+          <p:nvPr>
+            <p:ph type="title"/>
+          </p:nvPr>
+        </p:nvSpPr>
+        <p:spPr/>
+        <p:txBody>
+          <a:bodyPr/>
+          <a:lstStyle/>
+          <a:p>
+            <a:r>
+              <a:rPr lang="ru-RU" dirty="0"/>
+              <a:t>Линейная регрессия</a:t>
+            </a:r>
+          </a:p>
+        </p:txBody>
+      </p:sp>
+      <p:sp>
+        <p:nvSpPr>
+          <p:cNvPr id="3" name="Объект 2">
+            <a:extLst>
+              <a:ext uri="{FF2B5EF4-FFF2-40B4-BE49-F238E27FC236}">
+                <a16:creationId xmlns:a16="http://schemas.microsoft.com/office/drawing/2014/main" id="{8AA21B28-3F2A-CBF4-F3A2-D5F36D0256DA}"/>
+              </a:ext>
+            </a:extLst>
+          </p:cNvPr>
+          <p:cNvSpPr>
+            <a:spLocks noGrp="1"/>
+          </p:cNvSpPr>
+          <p:nvPr>
+            <p:ph idx="1"/>
+          </p:nvPr>
+        </p:nvSpPr>
+        <p:spPr/>
+        <p:txBody>
+          <a:bodyPr/>
+          <a:lstStyle/>
+          <a:p>
+            <a:pPr marL="0" indent="0">
+              <a:buNone/>
+            </a:pPr>
+            <a:r>
+              <a:rPr lang="ru-RU" dirty="0"/>
+              <a:t>Постановка задачи</a:t>
+            </a:r>
+          </a:p>
+        </p:txBody>
+      </p:sp>
+      <p:sp>
+        <p:nvSpPr>
+          <p:cNvPr id="4" name="Номер слайда 3">
+            <a:extLst>
+              <a:ext uri="{FF2B5EF4-FFF2-40B4-BE49-F238E27FC236}">
+                <a16:creationId xmlns:a16="http://schemas.microsoft.com/office/drawing/2014/main" id="{78A9489E-ECDF-4231-266C-103EA9F3B44A}"/>
+              </a:ext>
+            </a:extLst>
+          </p:cNvPr>
+          <p:cNvSpPr>
+            <a:spLocks noGrp="1"/>
+          </p:cNvSpPr>
+          <p:nvPr>
+            <p:ph type="sldNum" sz="quarter" idx="12"/>
+          </p:nvPr>
+        </p:nvSpPr>
+        <p:spPr/>
+        <p:txBody>
+          <a:bodyPr/>
+          <a:lstStyle/>
+          <a:p>
+            <a:fld id="{4B5110E4-62BB-43ED-9C58-95D1B7998FA6}" type="slidenum">
+              <a:rPr lang="ru-RU" smtClean="0"/>
+              <a:t>36</a:t>
+            </a:fld>
+            <a:endParaRPr lang="ru-RU"/>
+          </a:p>
+        </p:txBody>
+      </p:sp>
+      <p:pic>
+        <p:nvPicPr>
+          <p:cNvPr id="5" name="Picture 2">
+            <a:extLst>
+              <a:ext uri="{FF2B5EF4-FFF2-40B4-BE49-F238E27FC236}">
+                <a16:creationId xmlns:a16="http://schemas.microsoft.com/office/drawing/2014/main" id="{17FDE942-879D-473B-8925-E555FB4A5EE8}"/>
+              </a:ext>
+            </a:extLst>
+          </p:cNvPr>
+          <p:cNvPicPr>
+            <a:picLocks noChangeAspect="1" noChangeArrowheads="1"/>
+          </p:cNvPicPr>
+          <p:nvPr/>
+        </p:nvPicPr>
+        <p:blipFill>
+          <a:blip r:embed="rId2">
+            <a:extLst>
+              <a:ext uri="{28A0092B-C50C-407E-A947-70E740481C1C}">
+                <a14:useLocalDpi xmlns:a14="http://schemas.microsoft.com/office/drawing/2010/main" val="0"/>
+              </a:ext>
+            </a:extLst>
+          </a:blip>
+          <a:srcRect/>
+          <a:stretch>
+            <a:fillRect/>
+          </a:stretch>
+        </p:blipFill>
+        <p:spPr bwMode="auto">
+          <a:xfrm>
+            <a:off x="838199" y="2550851"/>
+            <a:ext cx="1659236" cy="420927"/>
+          </a:xfrm>
+          <a:prstGeom prst="rect">
+            <a:avLst/>
+          </a:prstGeom>
+          <a:noFill/>
+          <a:extLst>
+            <a:ext uri="{909E8E84-426E-40DD-AFC4-6F175D3DCCD1}">
+              <a14:hiddenFill xmlns:a14="http://schemas.microsoft.com/office/drawing/2010/main">
+                <a:solidFill>
+                  <a:srgbClr val="FFFFFF"/>
+                </a:solidFill>
+              </a14:hiddenFill>
+            </a:ext>
+          </a:extLst>
+        </p:spPr>
+      </p:pic>
+      <p:pic>
+        <p:nvPicPr>
+          <p:cNvPr id="6" name="Picture 4">
+            <a:extLst>
+              <a:ext uri="{FF2B5EF4-FFF2-40B4-BE49-F238E27FC236}">
+                <a16:creationId xmlns:a16="http://schemas.microsoft.com/office/drawing/2014/main" id="{64273050-F069-4549-BD75-400A2A313157}"/>
+              </a:ext>
+            </a:extLst>
+          </p:cNvPr>
+          <p:cNvPicPr>
+            <a:picLocks noChangeAspect="1" noChangeArrowheads="1"/>
+          </p:cNvPicPr>
+          <p:nvPr/>
+        </p:nvPicPr>
+        <p:blipFill>
+          <a:blip r:embed="rId3">
+            <a:extLst>
+              <a:ext uri="{28A0092B-C50C-407E-A947-70E740481C1C}">
+                <a14:useLocalDpi xmlns:a14="http://schemas.microsoft.com/office/drawing/2010/main" val="0"/>
+              </a:ext>
+            </a:extLst>
+          </a:blip>
+          <a:srcRect/>
+          <a:stretch>
+            <a:fillRect/>
+          </a:stretch>
+        </p:blipFill>
+        <p:spPr bwMode="auto">
+          <a:xfrm>
+            <a:off x="838199" y="3106715"/>
+            <a:ext cx="1355777" cy="371982"/>
+          </a:xfrm>
+          <a:prstGeom prst="rect">
+            <a:avLst/>
+          </a:prstGeom>
+          <a:noFill/>
+          <a:extLst>
+            <a:ext uri="{909E8E84-426E-40DD-AFC4-6F175D3DCCD1}">
+              <a14:hiddenFill xmlns:a14="http://schemas.microsoft.com/office/drawing/2010/main">
+                <a:solidFill>
+                  <a:srgbClr val="FFFFFF"/>
+                </a:solidFill>
+              </a14:hiddenFill>
+            </a:ext>
+          </a:extLst>
+        </p:spPr>
+      </p:pic>
+      <p:pic>
+        <p:nvPicPr>
+          <p:cNvPr id="7" name="Picture 6">
+            <a:extLst>
+              <a:ext uri="{FF2B5EF4-FFF2-40B4-BE49-F238E27FC236}">
+                <a16:creationId xmlns:a16="http://schemas.microsoft.com/office/drawing/2014/main" id="{FF19D43F-B5AF-42C8-AFC6-B65F8AC71D37}"/>
+              </a:ext>
+            </a:extLst>
+          </p:cNvPr>
+          <p:cNvPicPr>
+            <a:picLocks noChangeAspect="1" noChangeArrowheads="1"/>
+          </p:cNvPicPr>
+          <p:nvPr/>
+        </p:nvPicPr>
+        <p:blipFill>
+          <a:blip r:embed="rId4">
+            <a:extLst>
+              <a:ext uri="{28A0092B-C50C-407E-A947-70E740481C1C}">
+                <a14:useLocalDpi xmlns:a14="http://schemas.microsoft.com/office/drawing/2010/main" val="0"/>
+              </a:ext>
+            </a:extLst>
+          </a:blip>
+          <a:srcRect/>
+          <a:stretch>
+            <a:fillRect/>
+          </a:stretch>
+        </p:blipFill>
+        <p:spPr bwMode="auto">
+          <a:xfrm>
+            <a:off x="838199" y="3613634"/>
+            <a:ext cx="2300416" cy="460083"/>
+          </a:xfrm>
+          <a:prstGeom prst="rect">
+            <a:avLst/>
+          </a:prstGeom>
+          <a:noFill/>
+          <a:extLst>
+            <a:ext uri="{909E8E84-426E-40DD-AFC4-6F175D3DCCD1}">
+              <a14:hiddenFill xmlns:a14="http://schemas.microsoft.com/office/drawing/2010/main">
+                <a:solidFill>
+                  <a:srgbClr val="FFFFFF"/>
+                </a:solidFill>
+              </a14:hiddenFill>
+            </a:ext>
+          </a:extLst>
+        </p:spPr>
+      </p:pic>
+      <p:pic>
+        <p:nvPicPr>
+          <p:cNvPr id="8" name="Picture 10" descr="линейная регрессия">
+            <a:extLst>
+              <a:ext uri="{FF2B5EF4-FFF2-40B4-BE49-F238E27FC236}">
+                <a16:creationId xmlns:a16="http://schemas.microsoft.com/office/drawing/2014/main" id="{711E5A6D-5EBB-4E52-A009-90F6FE36A137}"/>
+              </a:ext>
+            </a:extLst>
+          </p:cNvPr>
+          <p:cNvPicPr>
+            <a:picLocks noChangeAspect="1" noChangeArrowheads="1"/>
+          </p:cNvPicPr>
+          <p:nvPr/>
+        </p:nvPicPr>
+        <p:blipFill>
+          <a:blip r:embed="rId5">
+            <a:extLst>
+              <a:ext uri="{28A0092B-C50C-407E-A947-70E740481C1C}">
+                <a14:useLocalDpi xmlns:a14="http://schemas.microsoft.com/office/drawing/2010/main" val="0"/>
+              </a:ext>
+            </a:extLst>
+          </a:blip>
+          <a:srcRect/>
+          <a:stretch>
+            <a:fillRect/>
+          </a:stretch>
+        </p:blipFill>
+        <p:spPr bwMode="auto">
+          <a:xfrm>
+            <a:off x="5479270" y="2349082"/>
+            <a:ext cx="5874530" cy="3304423"/>
+          </a:xfrm>
+          <a:prstGeom prst="rect">
+            <a:avLst/>
+          </a:prstGeom>
+          <a:noFill/>
+          <a:extLst>
+            <a:ext uri="{909E8E84-426E-40DD-AFC4-6F175D3DCCD1}">
+              <a14:hiddenFill xmlns:a14="http://schemas.microsoft.com/office/drawing/2010/main">
+                <a:solidFill>
+                  <a:srgbClr val="FFFFFF"/>
+                </a:solidFill>
+              </a14:hiddenFill>
+            </a:ext>
+          </a:extLst>
+        </p:spPr>
+      </p:pic>
+      <p:pic>
+        <p:nvPicPr>
+          <p:cNvPr id="9" name="Picture 2">
+            <a:extLst>
+              <a:ext uri="{FF2B5EF4-FFF2-40B4-BE49-F238E27FC236}">
+                <a16:creationId xmlns:a16="http://schemas.microsoft.com/office/drawing/2014/main" id="{C7680C06-6AC6-480C-BD36-8CFF4DB64218}"/>
+              </a:ext>
+            </a:extLst>
+          </p:cNvPr>
+          <p:cNvPicPr>
+            <a:picLocks noChangeAspect="1" noChangeArrowheads="1"/>
+          </p:cNvPicPr>
+          <p:nvPr/>
+        </p:nvPicPr>
+        <p:blipFill>
+          <a:blip r:embed="rId6">
+            <a:extLst>
+              <a:ext uri="{28A0092B-C50C-407E-A947-70E740481C1C}">
+                <a14:useLocalDpi xmlns:a14="http://schemas.microsoft.com/office/drawing/2010/main" val="0"/>
+              </a:ext>
+            </a:extLst>
+          </a:blip>
+          <a:srcRect/>
+          <a:stretch>
+            <a:fillRect/>
+          </a:stretch>
+        </p:blipFill>
+        <p:spPr bwMode="auto">
+          <a:xfrm>
+            <a:off x="838199" y="4208654"/>
+            <a:ext cx="3348873" cy="460083"/>
+          </a:xfrm>
+          <a:prstGeom prst="rect">
+            <a:avLst/>
+          </a:prstGeom>
+          <a:noFill/>
+          <a:extLst>
+            <a:ext uri="{909E8E84-426E-40DD-AFC4-6F175D3DCCD1}">
+              <a14:hiddenFill xmlns:a14="http://schemas.microsoft.com/office/drawing/2010/main">
+                <a:solidFill>
+                  <a:srgbClr val="FFFFFF"/>
+                </a:solidFill>
+              </a14:hiddenFill>
+            </a:ext>
+          </a:extLst>
+        </p:spPr>
+      </p:pic>
+      <p:sp>
+        <p:nvSpPr>
+          <p:cNvPr id="10" name="TextBox 3">
+            <a:extLst>
+              <a:ext uri="{FF2B5EF4-FFF2-40B4-BE49-F238E27FC236}">
+                <a16:creationId xmlns:a16="http://schemas.microsoft.com/office/drawing/2014/main" id="{C9D90E52-F1A4-4E50-832C-E7A7F6E2736A}"/>
+              </a:ext>
+            </a:extLst>
+          </p:cNvPr>
+          <p:cNvSpPr txBox="1"/>
+          <p:nvPr/>
+        </p:nvSpPr>
+        <p:spPr>
+          <a:xfrm>
+            <a:off x="838199" y="4803674"/>
+            <a:ext cx="4135007" cy="954107"/>
+          </a:xfrm>
+          <a:prstGeom prst="rect">
+            <a:avLst/>
+          </a:prstGeom>
+          <a:noFill/>
+        </p:spPr>
+        <p:txBody>
+          <a:bodyPr wrap="square" rtlCol="0">
+            <a:spAutoFit/>
+          </a:bodyPr>
+          <a:lstStyle>
+            <a:defPPr>
+              <a:defRPr lang="ru-RU"/>
+            </a:defPPr>
+            <a:lvl1pPr marL="0" algn="l" defTabSz="914400" rtl="0" eaLnBrk="1" latinLnBrk="0" hangingPunct="1">
+              <a:defRPr sz="1800" kern="1200">
+                <a:solidFill>
+                  <a:schemeClr val="tx1"/>
+                </a:solidFill>
+                <a:latin typeface="+mn-lt"/>
+                <a:ea typeface="+mn-ea"/>
+                <a:cs typeface="+mn-cs"/>
+              </a:defRPr>
+            </a:lvl1pPr>
+            <a:lvl2pPr marL="457200" algn="l" defTabSz="914400" rtl="0" eaLnBrk="1" latinLnBrk="0" hangingPunct="1">
+              <a:defRPr sz="1800" kern="1200">
+                <a:solidFill>
+                  <a:schemeClr val="tx1"/>
+                </a:solidFill>
+                <a:latin typeface="+mn-lt"/>
+                <a:ea typeface="+mn-ea"/>
+                <a:cs typeface="+mn-cs"/>
+              </a:defRPr>
+            </a:lvl2pPr>
+            <a:lvl3pPr marL="914400" algn="l" defTabSz="914400" rtl="0" eaLnBrk="1" latinLnBrk="0" hangingPunct="1">
+              <a:defRPr sz="1800" kern="1200">
+                <a:solidFill>
+                  <a:schemeClr val="tx1"/>
+                </a:solidFill>
+                <a:latin typeface="+mn-lt"/>
+                <a:ea typeface="+mn-ea"/>
+                <a:cs typeface="+mn-cs"/>
+              </a:defRPr>
+            </a:lvl3pPr>
+            <a:lvl4pPr marL="1371600" algn="l" defTabSz="914400" rtl="0" eaLnBrk="1" latinLnBrk="0" hangingPunct="1">
+              <a:defRPr sz="1800" kern="1200">
+                <a:solidFill>
+                  <a:schemeClr val="tx1"/>
+                </a:solidFill>
+                <a:latin typeface="+mn-lt"/>
+                <a:ea typeface="+mn-ea"/>
+                <a:cs typeface="+mn-cs"/>
+              </a:defRPr>
+            </a:lvl4pPr>
+            <a:lvl5pPr marL="1828800" algn="l" defTabSz="914400" rtl="0" eaLnBrk="1" latinLnBrk="0" hangingPunct="1">
+              <a:defRPr sz="1800" kern="1200">
+                <a:solidFill>
+                  <a:schemeClr val="tx1"/>
+                </a:solidFill>
+                <a:latin typeface="+mn-lt"/>
+                <a:ea typeface="+mn-ea"/>
+                <a:cs typeface="+mn-cs"/>
+              </a:defRPr>
+            </a:lvl5pPr>
+            <a:lvl6pPr marL="2286000" algn="l" defTabSz="914400" rtl="0" eaLnBrk="1" latinLnBrk="0" hangingPunct="1">
+              <a:defRPr sz="1800" kern="1200">
+                <a:solidFill>
+                  <a:schemeClr val="tx1"/>
+                </a:solidFill>
+                <a:latin typeface="+mn-lt"/>
+                <a:ea typeface="+mn-ea"/>
+                <a:cs typeface="+mn-cs"/>
+              </a:defRPr>
+            </a:lvl6pPr>
+            <a:lvl7pPr marL="2743200" algn="l" defTabSz="914400" rtl="0" eaLnBrk="1" latinLnBrk="0" hangingPunct="1">
+              <a:defRPr sz="1800" kern="1200">
+                <a:solidFill>
+                  <a:schemeClr val="tx1"/>
+                </a:solidFill>
+                <a:latin typeface="+mn-lt"/>
+                <a:ea typeface="+mn-ea"/>
+                <a:cs typeface="+mn-cs"/>
+              </a:defRPr>
+            </a:lvl7pPr>
+            <a:lvl8pPr marL="3200400" algn="l" defTabSz="914400" rtl="0" eaLnBrk="1" latinLnBrk="0" hangingPunct="1">
+              <a:defRPr sz="1800" kern="1200">
+                <a:solidFill>
+                  <a:schemeClr val="tx1"/>
+                </a:solidFill>
+                <a:latin typeface="+mn-lt"/>
+                <a:ea typeface="+mn-ea"/>
+                <a:cs typeface="+mn-cs"/>
+              </a:defRPr>
+            </a:lvl8pPr>
+            <a:lvl9pPr marL="3657600" algn="l" defTabSz="914400" rtl="0" eaLnBrk="1" latinLnBrk="0" hangingPunct="1">
+              <a:defRPr sz="1800" kern="1200">
+                <a:solidFill>
+                  <a:schemeClr val="tx1"/>
+                </a:solidFill>
+                <a:latin typeface="+mn-lt"/>
+                <a:ea typeface="+mn-ea"/>
+                <a:cs typeface="+mn-cs"/>
+              </a:defRPr>
+            </a:lvl9pPr>
+          </a:lstStyle>
+          <a:p>
+            <a:r>
+              <a:rPr lang="en-US" sz="2800" i="1" dirty="0">
+                <a:latin typeface="Lora" pitchFamily="2" charset="-52"/>
+              </a:rPr>
+              <a:t>w</a:t>
+            </a:r>
+            <a:r>
+              <a:rPr lang="en-US" sz="2800" dirty="0">
+                <a:latin typeface="Lora" pitchFamily="2" charset="-52"/>
+              </a:rPr>
+              <a:t> – </a:t>
+            </a:r>
+            <a:r>
+              <a:rPr lang="ru-RU" sz="2800" dirty="0">
+                <a:latin typeface="Lora" pitchFamily="2" charset="-52"/>
+              </a:rPr>
+              <a:t>веса</a:t>
+            </a:r>
+            <a:endParaRPr lang="en-US" sz="2800" dirty="0">
+              <a:latin typeface="Lora" pitchFamily="2" charset="-52"/>
+            </a:endParaRPr>
+          </a:p>
+          <a:p>
+            <a:r>
+              <a:rPr lang="en-US" sz="2800" i="1" dirty="0">
+                <a:latin typeface="Lora" pitchFamily="2" charset="-52"/>
+              </a:rPr>
+              <a:t>b – </a:t>
+            </a:r>
+            <a:r>
+              <a:rPr lang="ru-RU" sz="2800" dirty="0">
+                <a:latin typeface="Lora" pitchFamily="2" charset="-52"/>
+              </a:rPr>
+              <a:t>свободный член</a:t>
+            </a:r>
+          </a:p>
+        </p:txBody>
+      </p:sp>
+    </p:spTree>
+    <p:extLst>
+      <p:ext uri="{BB962C8B-B14F-4D97-AF65-F5344CB8AC3E}">
+        <p14:creationId xmlns:p14="http://schemas.microsoft.com/office/powerpoint/2010/main" val="1294425354"/>
+      </p:ext>
+    </p:extLst>
+  </p:cSld>
+  <p:clrMapOvr>
+    <a:masterClrMapping/>
+  </p:clrMapOvr>
+</p:sld>
+</file>
+
+<file path=ppt/slides/slide37.xml><?xml version="1.0" encoding="utf-8"?>
+<p:sld xmlns:a="http://schemas.openxmlformats.org/drawingml/2006/main" xmlns:r="http://schemas.openxmlformats.org/officeDocument/2006/relationships" xmlns:p="http://schemas.openxmlformats.org/presentationml/2006/main">
+  <p:cSld>
+    <p:spTree>
+      <p:nvGrpSpPr>
+        <p:cNvPr id="1" name=""/>
+        <p:cNvGrpSpPr/>
+        <p:nvPr/>
+      </p:nvGrpSpPr>
+      <p:grpSpPr>
+        <a:xfrm>
+          <a:off x="0" y="0"/>
+          <a:ext cx="0" cy="0"/>
+          <a:chOff x="0" y="0"/>
+          <a:chExt cx="0" cy="0"/>
+        </a:xfrm>
+      </p:grpSpPr>
+      <p:sp>
+        <p:nvSpPr>
+          <p:cNvPr id="2" name="Заголовок 1">
+            <a:extLst>
+              <a:ext uri="{FF2B5EF4-FFF2-40B4-BE49-F238E27FC236}">
+                <a16:creationId xmlns:a16="http://schemas.microsoft.com/office/drawing/2014/main" id="{0409E5FF-8B06-582E-F76B-779FDAB752B5}"/>
+              </a:ext>
+            </a:extLst>
+          </p:cNvPr>
+          <p:cNvSpPr>
+            <a:spLocks noGrp="1"/>
+          </p:cNvSpPr>
+          <p:nvPr>
+            <p:ph type="title"/>
+          </p:nvPr>
+        </p:nvSpPr>
+        <p:spPr/>
+        <p:txBody>
+          <a:bodyPr/>
+          <a:lstStyle/>
+          <a:p>
+            <a:r>
+              <a:rPr lang="ru-RU" dirty="0"/>
+              <a:t>Как выбрать линию?</a:t>
+            </a:r>
+          </a:p>
+        </p:txBody>
+      </p:sp>
+      <p:sp>
+        <p:nvSpPr>
+          <p:cNvPr id="4" name="Номер слайда 3">
+            <a:extLst>
+              <a:ext uri="{FF2B5EF4-FFF2-40B4-BE49-F238E27FC236}">
+                <a16:creationId xmlns:a16="http://schemas.microsoft.com/office/drawing/2014/main" id="{FFF1E7BA-4BCF-6A7C-26A5-C77610E827E7}"/>
+              </a:ext>
+            </a:extLst>
+          </p:cNvPr>
+          <p:cNvSpPr>
+            <a:spLocks noGrp="1"/>
+          </p:cNvSpPr>
+          <p:nvPr>
+            <p:ph type="sldNum" sz="quarter" idx="12"/>
+          </p:nvPr>
+        </p:nvSpPr>
+        <p:spPr/>
+        <p:txBody>
+          <a:bodyPr/>
+          <a:lstStyle/>
+          <a:p>
+            <a:fld id="{4B5110E4-62BB-43ED-9C58-95D1B7998FA6}" type="slidenum">
+              <a:rPr lang="ru-RU" smtClean="0"/>
+              <a:t>37</a:t>
+            </a:fld>
+            <a:endParaRPr lang="ru-RU"/>
+          </a:p>
+        </p:txBody>
+      </p:sp>
+      <p:pic>
+        <p:nvPicPr>
+          <p:cNvPr id="5" name="Picture 2">
+            <a:extLst>
+              <a:ext uri="{FF2B5EF4-FFF2-40B4-BE49-F238E27FC236}">
+                <a16:creationId xmlns:a16="http://schemas.microsoft.com/office/drawing/2014/main" id="{A32CFE6E-70FA-476B-B6DA-14A3F53AEDC9}"/>
+              </a:ext>
+            </a:extLst>
+          </p:cNvPr>
+          <p:cNvPicPr>
+            <a:picLocks noChangeAspect="1" noChangeArrowheads="1"/>
+          </p:cNvPicPr>
+          <p:nvPr/>
+        </p:nvPicPr>
+        <p:blipFill>
+          <a:blip r:embed="rId2">
+            <a:extLst>
+              <a:ext uri="{28A0092B-C50C-407E-A947-70E740481C1C}">
+                <a14:useLocalDpi xmlns:a14="http://schemas.microsoft.com/office/drawing/2010/main" val="0"/>
+              </a:ext>
+            </a:extLst>
+          </a:blip>
+          <a:srcRect/>
+          <a:stretch>
+            <a:fillRect/>
+          </a:stretch>
+        </p:blipFill>
+        <p:spPr bwMode="auto">
+          <a:xfrm>
+            <a:off x="7569740" y="1481476"/>
+            <a:ext cx="3202021" cy="2401516"/>
+          </a:xfrm>
+          <a:prstGeom prst="rect">
+            <a:avLst/>
+          </a:prstGeom>
+          <a:noFill/>
+          <a:extLst>
+            <a:ext uri="{909E8E84-426E-40DD-AFC4-6F175D3DCCD1}">
+              <a14:hiddenFill xmlns:a14="http://schemas.microsoft.com/office/drawing/2010/main">
+                <a:solidFill>
+                  <a:srgbClr val="FFFFFF"/>
+                </a:solidFill>
+              </a14:hiddenFill>
+            </a:ext>
+          </a:extLst>
+        </p:spPr>
+      </p:pic>
+      <p:pic>
+        <p:nvPicPr>
+          <p:cNvPr id="6" name="Picture 4">
+            <a:extLst>
+              <a:ext uri="{FF2B5EF4-FFF2-40B4-BE49-F238E27FC236}">
+                <a16:creationId xmlns:a16="http://schemas.microsoft.com/office/drawing/2014/main" id="{73737C0B-1208-4993-A096-312F1437DE29}"/>
+              </a:ext>
+            </a:extLst>
+          </p:cNvPr>
+          <p:cNvPicPr>
+            <a:picLocks noChangeAspect="1" noChangeArrowheads="1"/>
+          </p:cNvPicPr>
+          <p:nvPr/>
+        </p:nvPicPr>
+        <p:blipFill>
+          <a:blip r:embed="rId3">
+            <a:extLst>
+              <a:ext uri="{28A0092B-C50C-407E-A947-70E740481C1C}">
+                <a14:useLocalDpi xmlns:a14="http://schemas.microsoft.com/office/drawing/2010/main" val="0"/>
+              </a:ext>
+            </a:extLst>
+          </a:blip>
+          <a:srcRect/>
+          <a:stretch>
+            <a:fillRect/>
+          </a:stretch>
+        </p:blipFill>
+        <p:spPr bwMode="auto">
+          <a:xfrm>
+            <a:off x="4028872" y="3962941"/>
+            <a:ext cx="8005053" cy="2313460"/>
+          </a:xfrm>
+          <a:prstGeom prst="rect">
+            <a:avLst/>
+          </a:prstGeom>
+          <a:noFill/>
+          <a:extLst>
+            <a:ext uri="{909E8E84-426E-40DD-AFC4-6F175D3DCCD1}">
+              <a14:hiddenFill xmlns:a14="http://schemas.microsoft.com/office/drawing/2010/main">
+                <a:solidFill>
+                  <a:srgbClr val="FFFFFF"/>
+                </a:solidFill>
+              </a14:hiddenFill>
+            </a:ext>
+          </a:extLst>
+        </p:spPr>
+      </p:pic>
+      <p:pic>
+        <p:nvPicPr>
+          <p:cNvPr id="6146" name="Picture 2" descr="Стикер ВК Кусалочка #13">
+            <a:extLst>
+              <a:ext uri="{FF2B5EF4-FFF2-40B4-BE49-F238E27FC236}">
+                <a16:creationId xmlns:a16="http://schemas.microsoft.com/office/drawing/2014/main" id="{BBB19A96-C621-F147-87B0-D10480AB3B4E}"/>
+              </a:ext>
+            </a:extLst>
+          </p:cNvPr>
+          <p:cNvPicPr>
+            <a:picLocks noChangeAspect="1" noChangeArrowheads="1"/>
+          </p:cNvPicPr>
+          <p:nvPr/>
+        </p:nvPicPr>
+        <p:blipFill>
+          <a:blip r:embed="rId4">
+            <a:extLst>
+              <a:ext uri="{28A0092B-C50C-407E-A947-70E740481C1C}">
+                <a14:useLocalDpi xmlns:a14="http://schemas.microsoft.com/office/drawing/2010/main" val="0"/>
+              </a:ext>
+            </a:extLst>
+          </a:blip>
+          <a:srcRect/>
+          <a:stretch>
+            <a:fillRect/>
+          </a:stretch>
+        </p:blipFill>
+        <p:spPr bwMode="auto">
+          <a:xfrm>
+            <a:off x="905196" y="1481476"/>
+            <a:ext cx="3514353" cy="3514353"/>
+          </a:xfrm>
+          <a:prstGeom prst="rect">
+            <a:avLst/>
+          </a:prstGeom>
+          <a:noFill/>
+          <a:extLst>
+            <a:ext uri="{909E8E84-426E-40DD-AFC4-6F175D3DCCD1}">
+              <a14:hiddenFill xmlns:a14="http://schemas.microsoft.com/office/drawing/2010/main">
+                <a:solidFill>
+                  <a:srgbClr val="FFFFFF"/>
+                </a:solidFill>
+              </a14:hiddenFill>
+            </a:ext>
+          </a:extLst>
+        </p:spPr>
+      </p:pic>
+    </p:spTree>
+    <p:extLst>
+      <p:ext uri="{BB962C8B-B14F-4D97-AF65-F5344CB8AC3E}">
+        <p14:creationId xmlns:p14="http://schemas.microsoft.com/office/powerpoint/2010/main" val="3200328170"/>
+      </p:ext>
+    </p:extLst>
+  </p:cSld>
+  <p:clrMapOvr>
+    <a:masterClrMapping/>
+  </p:clrMapOvr>
+</p:sld>
+</file>
+
+<file path=ppt/slides/slide38.xml><?xml version="1.0" encoding="utf-8"?>
+<p:sld xmlns:a="http://schemas.openxmlformats.org/drawingml/2006/main" xmlns:r="http://schemas.openxmlformats.org/officeDocument/2006/relationships" xmlns:p="http://schemas.openxmlformats.org/presentationml/2006/main">
+  <p:cSld>
+    <p:spTree>
+      <p:nvGrpSpPr>
+        <p:cNvPr id="1" name=""/>
+        <p:cNvGrpSpPr/>
+        <p:nvPr/>
+      </p:nvGrpSpPr>
+      <p:grpSpPr>
+        <a:xfrm>
+          <a:off x="0" y="0"/>
+          <a:ext cx="0" cy="0"/>
+          <a:chOff x="0" y="0"/>
+          <a:chExt cx="0" cy="0"/>
+        </a:xfrm>
+      </p:grpSpPr>
+      <p:sp>
+        <p:nvSpPr>
+          <p:cNvPr id="2" name="Заголовок 1">
+            <a:extLst>
+              <a:ext uri="{FF2B5EF4-FFF2-40B4-BE49-F238E27FC236}">
+                <a16:creationId xmlns:a16="http://schemas.microsoft.com/office/drawing/2014/main" id="{2725FB8A-66FB-9CF0-5790-075AB0C82CD4}"/>
+              </a:ext>
+            </a:extLst>
+          </p:cNvPr>
+          <p:cNvSpPr>
+            <a:spLocks noGrp="1"/>
+          </p:cNvSpPr>
+          <p:nvPr>
+            <p:ph type="title"/>
+          </p:nvPr>
+        </p:nvSpPr>
+        <p:spPr/>
+        <p:txBody>
+          <a:bodyPr/>
+          <a:lstStyle/>
+          <a:p>
+            <a:r>
+              <a:rPr lang="ru-RU" dirty="0"/>
+              <a:t>Как измерить </a:t>
+            </a:r>
+            <a:r>
+              <a:rPr lang="ru-RU" dirty="0" err="1"/>
+              <a:t>хорошесть</a:t>
+            </a:r>
+            <a:r>
+              <a:rPr lang="ru-RU" dirty="0"/>
+              <a:t> предсказания?</a:t>
+            </a:r>
+          </a:p>
+        </p:txBody>
+      </p:sp>
+      <p:sp>
+        <p:nvSpPr>
+          <p:cNvPr id="3" name="Объект 2">
+            <a:extLst>
+              <a:ext uri="{FF2B5EF4-FFF2-40B4-BE49-F238E27FC236}">
+                <a16:creationId xmlns:a16="http://schemas.microsoft.com/office/drawing/2014/main" id="{3A50E3D8-692C-A1A1-AA06-39D6C09F1FA6}"/>
+              </a:ext>
+            </a:extLst>
+          </p:cNvPr>
+          <p:cNvSpPr>
+            <a:spLocks noGrp="1"/>
+          </p:cNvSpPr>
+          <p:nvPr>
+            <p:ph idx="1"/>
+          </p:nvPr>
+        </p:nvSpPr>
+        <p:spPr/>
+        <p:txBody>
+          <a:bodyPr/>
+          <a:lstStyle/>
+          <a:p>
+            <a:r>
+              <a:rPr lang="en-US" dirty="0"/>
+              <a:t>Mean Squared Error (MSE)</a:t>
+            </a:r>
+          </a:p>
+          <a:p>
+            <a:endParaRPr lang="en-US" dirty="0"/>
+          </a:p>
+          <a:p>
+            <a:r>
+              <a:rPr lang="en-US" dirty="0"/>
+              <a:t>Mean Absolute Error (MAE)</a:t>
+            </a:r>
+          </a:p>
+          <a:p>
+            <a:endParaRPr lang="en-US" dirty="0"/>
+          </a:p>
+          <a:p>
+            <a:r>
+              <a:rPr lang="en-US" dirty="0"/>
+              <a:t>Mean Absolute Percentage Error (MAPE)</a:t>
+            </a:r>
+          </a:p>
+          <a:p>
+            <a:endParaRPr lang="en-US" dirty="0"/>
+          </a:p>
+          <a:p>
+            <a:r>
+              <a:rPr lang="en-US" dirty="0"/>
+              <a:t>Root Mean Squared Error (RMSE)</a:t>
+            </a:r>
+            <a:endParaRPr lang="ru-RU" dirty="0"/>
+          </a:p>
+        </p:txBody>
+      </p:sp>
+      <p:sp>
+        <p:nvSpPr>
+          <p:cNvPr id="4" name="Номер слайда 3">
+            <a:extLst>
+              <a:ext uri="{FF2B5EF4-FFF2-40B4-BE49-F238E27FC236}">
+                <a16:creationId xmlns:a16="http://schemas.microsoft.com/office/drawing/2014/main" id="{E7253331-278D-245F-FBC8-28C04CE94810}"/>
+              </a:ext>
+            </a:extLst>
+          </p:cNvPr>
+          <p:cNvSpPr>
+            <a:spLocks noGrp="1"/>
+          </p:cNvSpPr>
+          <p:nvPr>
+            <p:ph type="sldNum" sz="quarter" idx="12"/>
+          </p:nvPr>
+        </p:nvSpPr>
+        <p:spPr/>
+        <p:txBody>
+          <a:bodyPr/>
+          <a:lstStyle/>
+          <a:p>
+            <a:fld id="{4B5110E4-62BB-43ED-9C58-95D1B7998FA6}" type="slidenum">
+              <a:rPr lang="ru-RU" smtClean="0"/>
+              <a:t>38</a:t>
+            </a:fld>
+            <a:endParaRPr lang="ru-RU"/>
+          </a:p>
+        </p:txBody>
+      </p:sp>
+      <p:pic>
+        <p:nvPicPr>
+          <p:cNvPr id="6" name="Рисунок 5">
+            <a:extLst>
+              <a:ext uri="{FF2B5EF4-FFF2-40B4-BE49-F238E27FC236}">
+                <a16:creationId xmlns:a16="http://schemas.microsoft.com/office/drawing/2014/main" id="{BFD76379-7671-C6AB-3AF5-E5A3477A0B25}"/>
+              </a:ext>
+            </a:extLst>
+          </p:cNvPr>
+          <p:cNvPicPr>
+            <a:picLocks noChangeAspect="1"/>
+          </p:cNvPicPr>
+          <p:nvPr/>
+        </p:nvPicPr>
+        <p:blipFill>
+          <a:blip r:embed="rId2"/>
+          <a:stretch>
+            <a:fillRect/>
+          </a:stretch>
+        </p:blipFill>
+        <p:spPr>
+          <a:xfrm>
+            <a:off x="1151952" y="2310295"/>
+            <a:ext cx="2143125" cy="561975"/>
+          </a:xfrm>
+          <a:prstGeom prst="rect">
+            <a:avLst/>
+          </a:prstGeom>
+        </p:spPr>
+      </p:pic>
+      <p:pic>
+        <p:nvPicPr>
+          <p:cNvPr id="8" name="Рисунок 7">
+            <a:extLst>
+              <a:ext uri="{FF2B5EF4-FFF2-40B4-BE49-F238E27FC236}">
+                <a16:creationId xmlns:a16="http://schemas.microsoft.com/office/drawing/2014/main" id="{BB1452EE-C0DF-604F-B18E-A0FBFBFB077F}"/>
+              </a:ext>
+            </a:extLst>
+          </p:cNvPr>
+          <p:cNvPicPr>
+            <a:picLocks noChangeAspect="1"/>
+          </p:cNvPicPr>
+          <p:nvPr/>
+        </p:nvPicPr>
+        <p:blipFill>
+          <a:blip r:embed="rId3"/>
+          <a:stretch>
+            <a:fillRect/>
+          </a:stretch>
+        </p:blipFill>
+        <p:spPr>
+          <a:xfrm>
+            <a:off x="1151952" y="4362450"/>
+            <a:ext cx="2924175" cy="571500"/>
+          </a:xfrm>
+          <a:prstGeom prst="rect">
+            <a:avLst/>
+          </a:prstGeom>
+        </p:spPr>
+      </p:pic>
+      <p:pic>
+        <p:nvPicPr>
+          <p:cNvPr id="10" name="Рисунок 9">
+            <a:extLst>
+              <a:ext uri="{FF2B5EF4-FFF2-40B4-BE49-F238E27FC236}">
+                <a16:creationId xmlns:a16="http://schemas.microsoft.com/office/drawing/2014/main" id="{5D8DD7C6-902B-E34B-09FA-CC89D12F9559}"/>
+              </a:ext>
+            </a:extLst>
+          </p:cNvPr>
+          <p:cNvPicPr>
+            <a:picLocks noChangeAspect="1"/>
+          </p:cNvPicPr>
+          <p:nvPr/>
+        </p:nvPicPr>
+        <p:blipFill>
+          <a:blip r:embed="rId4"/>
+          <a:stretch>
+            <a:fillRect/>
+          </a:stretch>
+        </p:blipFill>
+        <p:spPr>
+          <a:xfrm>
+            <a:off x="1151952" y="3355422"/>
+            <a:ext cx="2076450" cy="523875"/>
+          </a:xfrm>
+          <a:prstGeom prst="rect">
+            <a:avLst/>
+          </a:prstGeom>
+        </p:spPr>
+      </p:pic>
+      <p:pic>
+        <p:nvPicPr>
+          <p:cNvPr id="12" name="Рисунок 11">
+            <a:extLst>
+              <a:ext uri="{FF2B5EF4-FFF2-40B4-BE49-F238E27FC236}">
+                <a16:creationId xmlns:a16="http://schemas.microsoft.com/office/drawing/2014/main" id="{965605B5-9C5E-54EB-D75F-91A617C61C69}"/>
+              </a:ext>
+            </a:extLst>
+          </p:cNvPr>
+          <p:cNvPicPr>
+            <a:picLocks noChangeAspect="1"/>
+          </p:cNvPicPr>
+          <p:nvPr/>
+        </p:nvPicPr>
+        <p:blipFill>
+          <a:blip r:embed="rId5"/>
+          <a:stretch>
+            <a:fillRect/>
+          </a:stretch>
+        </p:blipFill>
+        <p:spPr>
+          <a:xfrm>
+            <a:off x="1151952" y="5417103"/>
+            <a:ext cx="2457450" cy="581025"/>
+          </a:xfrm>
+          <a:prstGeom prst="rect">
+            <a:avLst/>
+          </a:prstGeom>
+        </p:spPr>
+      </p:pic>
+      <p:pic>
+        <p:nvPicPr>
+          <p:cNvPr id="7170" name="Picture 2" descr="Стикер ВК Миу-Мяу и Кусалочка #19">
+            <a:extLst>
+              <a:ext uri="{FF2B5EF4-FFF2-40B4-BE49-F238E27FC236}">
+                <a16:creationId xmlns:a16="http://schemas.microsoft.com/office/drawing/2014/main" id="{0FE97D75-AB5D-EEC0-A723-30C67B39047D}"/>
+              </a:ext>
+            </a:extLst>
+          </p:cNvPr>
+          <p:cNvPicPr>
+            <a:picLocks noChangeAspect="1" noChangeArrowheads="1"/>
+          </p:cNvPicPr>
+          <p:nvPr/>
+        </p:nvPicPr>
+        <p:blipFill>
+          <a:blip r:embed="rId6">
+            <a:extLst>
+              <a:ext uri="{28A0092B-C50C-407E-A947-70E740481C1C}">
+                <a14:useLocalDpi xmlns:a14="http://schemas.microsoft.com/office/drawing/2010/main" val="0"/>
+              </a:ext>
+            </a:extLst>
+          </a:blip>
+          <a:srcRect/>
+          <a:stretch>
+            <a:fillRect/>
+          </a:stretch>
+        </p:blipFill>
+        <p:spPr bwMode="auto">
+          <a:xfrm>
+            <a:off x="7402748" y="1348770"/>
+            <a:ext cx="4537178" cy="4537178"/>
+          </a:xfrm>
+          <a:prstGeom prst="rect">
+            <a:avLst/>
+          </a:prstGeom>
+          <a:noFill/>
+          <a:extLst>
+            <a:ext uri="{909E8E84-426E-40DD-AFC4-6F175D3DCCD1}">
+              <a14:hiddenFill xmlns:a14="http://schemas.microsoft.com/office/drawing/2010/main">
+                <a:solidFill>
+                  <a:srgbClr val="FFFFFF"/>
+                </a:solidFill>
+              </a14:hiddenFill>
+            </a:ext>
+          </a:extLst>
+        </p:spPr>
+      </p:pic>
+    </p:spTree>
+    <p:extLst>
+      <p:ext uri="{BB962C8B-B14F-4D97-AF65-F5344CB8AC3E}">
+        <p14:creationId xmlns:p14="http://schemas.microsoft.com/office/powerpoint/2010/main" val="2218062410"/>
+      </p:ext>
+    </p:extLst>
+  </p:cSld>
+  <p:clrMapOvr>
+    <a:masterClrMapping/>
+  </p:clrMapOvr>
+</p:sld>
+</file>
+
+<file path=ppt/slides/slide39.xml><?xml version="1.0" encoding="utf-8"?>
+<p:sld xmlns:a="http://schemas.openxmlformats.org/drawingml/2006/main" xmlns:r="http://schemas.openxmlformats.org/officeDocument/2006/relationships" xmlns:p="http://schemas.openxmlformats.org/presentationml/2006/main">
+  <p:cSld>
+    <p:spTree>
+      <p:nvGrpSpPr>
+        <p:cNvPr id="1" name=""/>
+        <p:cNvGrpSpPr/>
+        <p:nvPr/>
+      </p:nvGrpSpPr>
+      <p:grpSpPr>
+        <a:xfrm>
+          <a:off x="0" y="0"/>
+          <a:ext cx="0" cy="0"/>
+          <a:chOff x="0" y="0"/>
+          <a:chExt cx="0" cy="0"/>
+        </a:xfrm>
+      </p:grpSpPr>
+      <p:sp>
+        <p:nvSpPr>
+          <p:cNvPr id="2" name="Заголовок 1">
+            <a:extLst>
+              <a:ext uri="{FF2B5EF4-FFF2-40B4-BE49-F238E27FC236}">
+                <a16:creationId xmlns:a16="http://schemas.microsoft.com/office/drawing/2014/main" id="{0F3941DD-C4A7-7B6D-03CC-1E68DBFBC9A9}"/>
+              </a:ext>
+            </a:extLst>
+          </p:cNvPr>
+          <p:cNvSpPr>
+            <a:spLocks noGrp="1"/>
+          </p:cNvSpPr>
+          <p:nvPr>
+            <p:ph type="title"/>
+          </p:nvPr>
+        </p:nvSpPr>
+        <p:spPr/>
+        <p:txBody>
+          <a:bodyPr/>
+          <a:lstStyle/>
+          <a:p>
+            <a:r>
+              <a:rPr lang="ru-RU" dirty="0"/>
+              <a:t>Классификация</a:t>
+            </a:r>
+          </a:p>
+        </p:txBody>
+      </p:sp>
+      <p:sp>
+        <p:nvSpPr>
+          <p:cNvPr id="3" name="Объект 2">
+            <a:extLst>
+              <a:ext uri="{FF2B5EF4-FFF2-40B4-BE49-F238E27FC236}">
+                <a16:creationId xmlns:a16="http://schemas.microsoft.com/office/drawing/2014/main" id="{92BA0A27-20C8-92B3-F7AA-DFCDCFCDD8FA}"/>
+              </a:ext>
+            </a:extLst>
+          </p:cNvPr>
+          <p:cNvSpPr>
+            <a:spLocks noGrp="1"/>
+          </p:cNvSpPr>
+          <p:nvPr>
+            <p:ph idx="1"/>
+          </p:nvPr>
+        </p:nvSpPr>
+        <p:spPr>
+          <a:xfrm>
+            <a:off x="838200" y="1825625"/>
+            <a:ext cx="9846276" cy="1247089"/>
+          </a:xfrm>
+        </p:spPr>
+        <p:txBody>
+          <a:bodyPr/>
+          <a:lstStyle/>
+          <a:p>
+            <a:pPr marL="0" indent="0">
+              <a:buNone/>
+            </a:pPr>
+            <a:r>
+              <a:rPr lang="ru-RU" i="1" dirty="0"/>
+              <a:t>«Разделяет объекты по заранее известному признаку. Документы по языкам, музыку по жанрам, листочки по цветам.»</a:t>
+            </a:r>
+          </a:p>
+        </p:txBody>
+      </p:sp>
+      <p:sp>
+        <p:nvSpPr>
+          <p:cNvPr id="4" name="Номер слайда 3">
+            <a:extLst>
+              <a:ext uri="{FF2B5EF4-FFF2-40B4-BE49-F238E27FC236}">
+                <a16:creationId xmlns:a16="http://schemas.microsoft.com/office/drawing/2014/main" id="{BF7004FC-1A41-D612-8047-4672D2984C36}"/>
+              </a:ext>
+            </a:extLst>
+          </p:cNvPr>
+          <p:cNvSpPr>
+            <a:spLocks noGrp="1"/>
+          </p:cNvSpPr>
+          <p:nvPr>
+            <p:ph type="sldNum" sz="quarter" idx="12"/>
+          </p:nvPr>
+        </p:nvSpPr>
+        <p:spPr/>
+        <p:txBody>
+          <a:bodyPr/>
+          <a:lstStyle/>
+          <a:p>
+            <a:fld id="{4B5110E4-62BB-43ED-9C58-95D1B7998FA6}" type="slidenum">
+              <a:rPr lang="ru-RU" smtClean="0"/>
+              <a:t>39</a:t>
+            </a:fld>
+            <a:endParaRPr lang="ru-RU"/>
+          </a:p>
+        </p:txBody>
+      </p:sp>
+      <p:sp>
+        <p:nvSpPr>
+          <p:cNvPr id="5" name="TextBox 4">
+            <a:extLst>
+              <a:ext uri="{FF2B5EF4-FFF2-40B4-BE49-F238E27FC236}">
+                <a16:creationId xmlns:a16="http://schemas.microsoft.com/office/drawing/2014/main" id="{8AEDEC73-A2A2-460B-BFF8-E4453EB3EDF5}"/>
+              </a:ext>
+            </a:extLst>
+          </p:cNvPr>
+          <p:cNvSpPr txBox="1"/>
+          <p:nvPr/>
+        </p:nvSpPr>
+        <p:spPr>
+          <a:xfrm>
+            <a:off x="6096000" y="3072714"/>
+            <a:ext cx="5210081" cy="2308324"/>
+          </a:xfrm>
+          <a:prstGeom prst="rect">
+            <a:avLst/>
+          </a:prstGeom>
+          <a:noFill/>
+        </p:spPr>
+        <p:txBody>
+          <a:bodyPr wrap="none" rtlCol="0">
+            <a:spAutoFit/>
+          </a:bodyPr>
+          <a:lstStyle/>
+          <a:p>
+            <a:r>
+              <a:rPr lang="ru-RU" dirty="0"/>
+              <a:t>Сегодня используют для:</a:t>
+            </a:r>
+          </a:p>
+          <a:p>
+            <a:endParaRPr lang="ru-RU" dirty="0"/>
+          </a:p>
+          <a:p>
+            <a:pPr marL="285750" indent="-285750">
+              <a:buFont typeface="Arial" panose="020B0604020202020204" pitchFamily="34" charset="0"/>
+              <a:buChar char="•"/>
+            </a:pPr>
+            <a:r>
+              <a:rPr lang="ru-RU" dirty="0"/>
+              <a:t>Спам-фильтры</a:t>
+            </a:r>
+          </a:p>
+          <a:p>
+            <a:pPr marL="285750" indent="-285750">
+              <a:buFont typeface="Arial" panose="020B0604020202020204" pitchFamily="34" charset="0"/>
+              <a:buChar char="•"/>
+            </a:pPr>
+            <a:r>
+              <a:rPr lang="ru-RU" dirty="0"/>
+              <a:t>Определение языка</a:t>
+            </a:r>
+          </a:p>
+          <a:p>
+            <a:pPr marL="285750" indent="-285750">
+              <a:buFont typeface="Arial" panose="020B0604020202020204" pitchFamily="34" charset="0"/>
+              <a:buChar char="•"/>
+            </a:pPr>
+            <a:r>
+              <a:rPr lang="ru-RU" dirty="0"/>
+              <a:t>Поиск похожих документов</a:t>
+            </a:r>
+          </a:p>
+          <a:p>
+            <a:pPr marL="285750" indent="-285750">
+              <a:buFont typeface="Arial" panose="020B0604020202020204" pitchFamily="34" charset="0"/>
+              <a:buChar char="•"/>
+            </a:pPr>
+            <a:r>
+              <a:rPr lang="ru-RU" dirty="0"/>
+              <a:t>Анализ тональности</a:t>
+            </a:r>
+          </a:p>
+          <a:p>
+            <a:pPr marL="285750" indent="-285750">
+              <a:buFont typeface="Arial" panose="020B0604020202020204" pitchFamily="34" charset="0"/>
+              <a:buChar char="•"/>
+            </a:pPr>
+            <a:r>
+              <a:rPr lang="ru-RU" dirty="0"/>
+              <a:t>Распознавание рукописных букв и цифр</a:t>
+            </a:r>
+          </a:p>
+          <a:p>
+            <a:pPr marL="285750" indent="-285750">
+              <a:buFont typeface="Arial" panose="020B0604020202020204" pitchFamily="34" charset="0"/>
+              <a:buChar char="•"/>
+            </a:pPr>
+            <a:r>
+              <a:rPr lang="ru-RU" dirty="0"/>
+              <a:t>Определение подозрительных транзакций</a:t>
+            </a:r>
+          </a:p>
+        </p:txBody>
+      </p:sp>
+      <p:pic>
+        <p:nvPicPr>
+          <p:cNvPr id="8194" name="Picture 2" descr="Стикер ВК Квип #16">
+            <a:extLst>
+              <a:ext uri="{FF2B5EF4-FFF2-40B4-BE49-F238E27FC236}">
+                <a16:creationId xmlns:a16="http://schemas.microsoft.com/office/drawing/2014/main" id="{81438861-79C7-DFEB-CB42-60A6C1ED6246}"/>
+              </a:ext>
+            </a:extLst>
+          </p:cNvPr>
+          <p:cNvPicPr>
+            <a:picLocks noChangeAspect="1" noChangeArrowheads="1"/>
+          </p:cNvPicPr>
+          <p:nvPr/>
+        </p:nvPicPr>
+        <p:blipFill>
+          <a:blip r:embed="rId2">
+            <a:extLst>
+              <a:ext uri="{28A0092B-C50C-407E-A947-70E740481C1C}">
+                <a14:useLocalDpi xmlns:a14="http://schemas.microsoft.com/office/drawing/2010/main" val="0"/>
+              </a:ext>
+            </a:extLst>
+          </a:blip>
+          <a:srcRect/>
+          <a:stretch>
+            <a:fillRect/>
+          </a:stretch>
+        </p:blipFill>
+        <p:spPr bwMode="auto">
+          <a:xfrm>
+            <a:off x="1087395" y="3072714"/>
+            <a:ext cx="3650349" cy="3650349"/>
+          </a:xfrm>
+          <a:prstGeom prst="rect">
+            <a:avLst/>
+          </a:prstGeom>
+          <a:noFill/>
+          <a:extLst>
+            <a:ext uri="{909E8E84-426E-40DD-AFC4-6F175D3DCCD1}">
+              <a14:hiddenFill xmlns:a14="http://schemas.microsoft.com/office/drawing/2010/main">
+                <a:solidFill>
+                  <a:srgbClr val="FFFFFF"/>
+                </a:solidFill>
+              </a14:hiddenFill>
+            </a:ext>
+          </a:extLst>
+        </p:spPr>
+      </p:pic>
+    </p:spTree>
+    <p:extLst>
+      <p:ext uri="{BB962C8B-B14F-4D97-AF65-F5344CB8AC3E}">
+        <p14:creationId xmlns:p14="http://schemas.microsoft.com/office/powerpoint/2010/main" val="1801562472"/>
+      </p:ext>
+    </p:extLst>
+  </p:cSld>
+  <p:clrMapOvr>
+    <a:masterClrMapping/>
+  </p:clrMapOvr>
+</p:sld>
+</file>
+
 <file path=ppt/slides/slide4.xml><?xml version="1.0" encoding="utf-8"?>
 <p:sld xmlns:a="http://schemas.openxmlformats.org/drawingml/2006/main" xmlns:r="http://schemas.openxmlformats.org/officeDocument/2006/relationships" xmlns:p="http://schemas.openxmlformats.org/presentationml/2006/main">
   <p:cSld>
@@ -7558,6 +9998,1091 @@
     <p:extLst>
       <p:ext uri="{BB962C8B-B14F-4D97-AF65-F5344CB8AC3E}">
         <p14:creationId xmlns:p14="http://schemas.microsoft.com/office/powerpoint/2010/main" val="3425583209"/>
+      </p:ext>
+    </p:extLst>
+  </p:cSld>
+  <p:clrMapOvr>
+    <a:masterClrMapping/>
+  </p:clrMapOvr>
+</p:sld>
+</file>
+
+<file path=ppt/slides/slide40.xml><?xml version="1.0" encoding="utf-8"?>
+<p:sld xmlns:a="http://schemas.openxmlformats.org/drawingml/2006/main" xmlns:r="http://schemas.openxmlformats.org/officeDocument/2006/relationships" xmlns:p="http://schemas.openxmlformats.org/presentationml/2006/main">
+  <p:cSld>
+    <p:spTree>
+      <p:nvGrpSpPr>
+        <p:cNvPr id="1" name=""/>
+        <p:cNvGrpSpPr/>
+        <p:nvPr/>
+      </p:nvGrpSpPr>
+      <p:grpSpPr>
+        <a:xfrm>
+          <a:off x="0" y="0"/>
+          <a:ext cx="0" cy="0"/>
+          <a:chOff x="0" y="0"/>
+          <a:chExt cx="0" cy="0"/>
+        </a:xfrm>
+      </p:grpSpPr>
+      <p:sp>
+        <p:nvSpPr>
+          <p:cNvPr id="2" name="Заголовок 1">
+            <a:extLst>
+              <a:ext uri="{FF2B5EF4-FFF2-40B4-BE49-F238E27FC236}">
+                <a16:creationId xmlns:a16="http://schemas.microsoft.com/office/drawing/2014/main" id="{87BC8A5A-E225-7573-FB8E-56767939DE5E}"/>
+              </a:ext>
+            </a:extLst>
+          </p:cNvPr>
+          <p:cNvSpPr>
+            <a:spLocks noGrp="1"/>
+          </p:cNvSpPr>
+          <p:nvPr>
+            <p:ph type="title"/>
+          </p:nvPr>
+        </p:nvSpPr>
+        <p:spPr/>
+        <p:txBody>
+          <a:bodyPr/>
+          <a:lstStyle/>
+          <a:p>
+            <a:r>
+              <a:rPr lang="ru-RU" dirty="0"/>
+              <a:t>Логистическая регрессия</a:t>
+            </a:r>
+          </a:p>
+        </p:txBody>
+      </p:sp>
+      <p:sp>
+        <p:nvSpPr>
+          <p:cNvPr id="3" name="Объект 2">
+            <a:extLst>
+              <a:ext uri="{FF2B5EF4-FFF2-40B4-BE49-F238E27FC236}">
+                <a16:creationId xmlns:a16="http://schemas.microsoft.com/office/drawing/2014/main" id="{37B53D30-4A99-F40A-2FF4-CB882EC58D0C}"/>
+              </a:ext>
+            </a:extLst>
+          </p:cNvPr>
+          <p:cNvSpPr>
+            <a:spLocks noGrp="1"/>
+          </p:cNvSpPr>
+          <p:nvPr>
+            <p:ph idx="1"/>
+          </p:nvPr>
+        </p:nvSpPr>
+        <p:spPr/>
+        <p:txBody>
+          <a:bodyPr/>
+          <a:lstStyle/>
+          <a:p>
+            <a:pPr marL="0" indent="0">
+              <a:buNone/>
+            </a:pPr>
+            <a:r>
+              <a:rPr lang="ru-RU" dirty="0"/>
+              <a:t>В простейшем случае бинарной классификации все как в линейной регрессии, только запихнем результат в логистическую функцию:</a:t>
+            </a:r>
+          </a:p>
+        </p:txBody>
+      </p:sp>
+      <p:sp>
+        <p:nvSpPr>
+          <p:cNvPr id="4" name="Номер слайда 3">
+            <a:extLst>
+              <a:ext uri="{FF2B5EF4-FFF2-40B4-BE49-F238E27FC236}">
+                <a16:creationId xmlns:a16="http://schemas.microsoft.com/office/drawing/2014/main" id="{29B0DC9F-2905-C817-088E-3A1CD2D51733}"/>
+              </a:ext>
+            </a:extLst>
+          </p:cNvPr>
+          <p:cNvSpPr>
+            <a:spLocks noGrp="1"/>
+          </p:cNvSpPr>
+          <p:nvPr>
+            <p:ph type="sldNum" sz="quarter" idx="12"/>
+          </p:nvPr>
+        </p:nvSpPr>
+        <p:spPr/>
+        <p:txBody>
+          <a:bodyPr/>
+          <a:lstStyle/>
+          <a:p>
+            <a:fld id="{4B5110E4-62BB-43ED-9C58-95D1B7998FA6}" type="slidenum">
+              <a:rPr lang="ru-RU" smtClean="0"/>
+              <a:t>40</a:t>
+            </a:fld>
+            <a:endParaRPr lang="ru-RU"/>
+          </a:p>
+        </p:txBody>
+      </p:sp>
+      <p:pic>
+        <p:nvPicPr>
+          <p:cNvPr id="9218" name="Picture 2">
+            <a:extLst>
+              <a:ext uri="{FF2B5EF4-FFF2-40B4-BE49-F238E27FC236}">
+                <a16:creationId xmlns:a16="http://schemas.microsoft.com/office/drawing/2014/main" id="{F9E32A13-5915-FB22-79EE-5AA95F6CD22D}"/>
+              </a:ext>
+            </a:extLst>
+          </p:cNvPr>
+          <p:cNvPicPr>
+            <a:picLocks noChangeAspect="1" noChangeArrowheads="1"/>
+          </p:cNvPicPr>
+          <p:nvPr/>
+        </p:nvPicPr>
+        <p:blipFill>
+          <a:blip r:embed="rId2">
+            <a:extLst>
+              <a:ext uri="{28A0092B-C50C-407E-A947-70E740481C1C}">
+                <a14:useLocalDpi xmlns:a14="http://schemas.microsoft.com/office/drawing/2010/main" val="0"/>
+              </a:ext>
+            </a:extLst>
+          </a:blip>
+          <a:srcRect/>
+          <a:stretch>
+            <a:fillRect/>
+          </a:stretch>
+        </p:blipFill>
+        <p:spPr bwMode="auto">
+          <a:xfrm>
+            <a:off x="1066538" y="3207476"/>
+            <a:ext cx="3048000" cy="2286000"/>
+          </a:xfrm>
+          <a:prstGeom prst="rect">
+            <a:avLst/>
+          </a:prstGeom>
+          <a:noFill/>
+          <a:extLst>
+            <a:ext uri="{909E8E84-426E-40DD-AFC4-6F175D3DCCD1}">
+              <a14:hiddenFill xmlns:a14="http://schemas.microsoft.com/office/drawing/2010/main">
+                <a:solidFill>
+                  <a:srgbClr val="FFFFFF"/>
+                </a:solidFill>
+              </a14:hiddenFill>
+            </a:ext>
+          </a:extLst>
+        </p:spPr>
+      </p:pic>
+      <p:pic>
+        <p:nvPicPr>
+          <p:cNvPr id="6" name="Рисунок 5">
+            <a:extLst>
+              <a:ext uri="{FF2B5EF4-FFF2-40B4-BE49-F238E27FC236}">
+                <a16:creationId xmlns:a16="http://schemas.microsoft.com/office/drawing/2014/main" id="{26AA7346-1D3E-8E13-BF8E-FAE6707BD387}"/>
+              </a:ext>
+            </a:extLst>
+          </p:cNvPr>
+          <p:cNvPicPr>
+            <a:picLocks noChangeAspect="1"/>
+          </p:cNvPicPr>
+          <p:nvPr/>
+        </p:nvPicPr>
+        <p:blipFill>
+          <a:blip r:embed="rId3"/>
+          <a:stretch>
+            <a:fillRect/>
+          </a:stretch>
+        </p:blipFill>
+        <p:spPr>
+          <a:xfrm>
+            <a:off x="1810331" y="5628413"/>
+            <a:ext cx="1560414" cy="683487"/>
+          </a:xfrm>
+          <a:prstGeom prst="rect">
+            <a:avLst/>
+          </a:prstGeom>
+        </p:spPr>
+      </p:pic>
+      <p:pic>
+        <p:nvPicPr>
+          <p:cNvPr id="9220" name="Picture 4" descr="Стикер ВК Кусалочка #8">
+            <a:extLst>
+              <a:ext uri="{FF2B5EF4-FFF2-40B4-BE49-F238E27FC236}">
+                <a16:creationId xmlns:a16="http://schemas.microsoft.com/office/drawing/2014/main" id="{94D82DBE-7F4E-3E3C-C56A-490F0E624C5F}"/>
+              </a:ext>
+            </a:extLst>
+          </p:cNvPr>
+          <p:cNvPicPr>
+            <a:picLocks noChangeAspect="1" noChangeArrowheads="1"/>
+          </p:cNvPicPr>
+          <p:nvPr/>
+        </p:nvPicPr>
+        <p:blipFill>
+          <a:blip r:embed="rId4">
+            <a:extLst>
+              <a:ext uri="{28A0092B-C50C-407E-A947-70E740481C1C}">
+                <a14:useLocalDpi xmlns:a14="http://schemas.microsoft.com/office/drawing/2010/main" val="0"/>
+              </a:ext>
+            </a:extLst>
+          </a:blip>
+          <a:srcRect/>
+          <a:stretch>
+            <a:fillRect/>
+          </a:stretch>
+        </p:blipFill>
+        <p:spPr bwMode="auto">
+          <a:xfrm>
+            <a:off x="5821873" y="2714321"/>
+            <a:ext cx="3824591" cy="3824591"/>
+          </a:xfrm>
+          <a:prstGeom prst="rect">
+            <a:avLst/>
+          </a:prstGeom>
+          <a:noFill/>
+          <a:extLst>
+            <a:ext uri="{909E8E84-426E-40DD-AFC4-6F175D3DCCD1}">
+              <a14:hiddenFill xmlns:a14="http://schemas.microsoft.com/office/drawing/2010/main">
+                <a:solidFill>
+                  <a:srgbClr val="FFFFFF"/>
+                </a:solidFill>
+              </a14:hiddenFill>
+            </a:ext>
+          </a:extLst>
+        </p:spPr>
+      </p:pic>
+    </p:spTree>
+    <p:extLst>
+      <p:ext uri="{BB962C8B-B14F-4D97-AF65-F5344CB8AC3E}">
+        <p14:creationId xmlns:p14="http://schemas.microsoft.com/office/powerpoint/2010/main" val="321752059"/>
+      </p:ext>
+    </p:extLst>
+  </p:cSld>
+  <p:clrMapOvr>
+    <a:masterClrMapping/>
+  </p:clrMapOvr>
+</p:sld>
+</file>
+
+<file path=ppt/slides/slide41.xml><?xml version="1.0" encoding="utf-8"?>
+<p:sld xmlns:a="http://schemas.openxmlformats.org/drawingml/2006/main" xmlns:r="http://schemas.openxmlformats.org/officeDocument/2006/relationships" xmlns:p="http://schemas.openxmlformats.org/presentationml/2006/main">
+  <p:cSld>
+    <p:spTree>
+      <p:nvGrpSpPr>
+        <p:cNvPr id="1" name=""/>
+        <p:cNvGrpSpPr/>
+        <p:nvPr/>
+      </p:nvGrpSpPr>
+      <p:grpSpPr>
+        <a:xfrm>
+          <a:off x="0" y="0"/>
+          <a:ext cx="0" cy="0"/>
+          <a:chOff x="0" y="0"/>
+          <a:chExt cx="0" cy="0"/>
+        </a:xfrm>
+      </p:grpSpPr>
+      <p:sp>
+        <p:nvSpPr>
+          <p:cNvPr id="2" name="Заголовок 1">
+            <a:extLst>
+              <a:ext uri="{FF2B5EF4-FFF2-40B4-BE49-F238E27FC236}">
+                <a16:creationId xmlns:a16="http://schemas.microsoft.com/office/drawing/2014/main" id="{84111355-7206-FE6C-D94B-BF06A1AF18C6}"/>
+              </a:ext>
+            </a:extLst>
+          </p:cNvPr>
+          <p:cNvSpPr>
+            <a:spLocks noGrp="1"/>
+          </p:cNvSpPr>
+          <p:nvPr>
+            <p:ph type="title"/>
+          </p:nvPr>
+        </p:nvSpPr>
+        <p:spPr/>
+        <p:txBody>
+          <a:bodyPr/>
+          <a:lstStyle/>
+          <a:p>
+            <a:r>
+              <a:rPr lang="ru-RU" dirty="0"/>
+              <a:t>Метрики классификации</a:t>
+            </a:r>
+          </a:p>
+        </p:txBody>
+      </p:sp>
+      <p:sp>
+        <p:nvSpPr>
+          <p:cNvPr id="3" name="Объект 2">
+            <a:extLst>
+              <a:ext uri="{FF2B5EF4-FFF2-40B4-BE49-F238E27FC236}">
+                <a16:creationId xmlns:a16="http://schemas.microsoft.com/office/drawing/2014/main" id="{44132598-3AB3-A711-69A2-EF5725FEBCAB}"/>
+              </a:ext>
+            </a:extLst>
+          </p:cNvPr>
+          <p:cNvSpPr>
+            <a:spLocks noGrp="1"/>
+          </p:cNvSpPr>
+          <p:nvPr>
+            <p:ph idx="1"/>
+          </p:nvPr>
+        </p:nvSpPr>
+        <p:spPr/>
+        <p:txBody>
+          <a:bodyPr/>
+          <a:lstStyle/>
+          <a:p>
+            <a:r>
+              <a:rPr lang="en-US" dirty="0"/>
+              <a:t>Accuracy</a:t>
+            </a:r>
+          </a:p>
+          <a:p>
+            <a:endParaRPr lang="en-US" dirty="0"/>
+          </a:p>
+          <a:p>
+            <a:endParaRPr lang="en-US" dirty="0"/>
+          </a:p>
+          <a:p>
+            <a:r>
+              <a:rPr lang="en-US" dirty="0"/>
+              <a:t>Precision</a:t>
+            </a:r>
+          </a:p>
+          <a:p>
+            <a:endParaRPr lang="en-US" dirty="0"/>
+          </a:p>
+          <a:p>
+            <a:endParaRPr lang="en-US" dirty="0"/>
+          </a:p>
+          <a:p>
+            <a:r>
+              <a:rPr lang="en-US" dirty="0"/>
+              <a:t>Recall</a:t>
+            </a:r>
+          </a:p>
+          <a:p>
+            <a:endParaRPr lang="en-US" dirty="0"/>
+          </a:p>
+          <a:p>
+            <a:endParaRPr lang="ru-RU" dirty="0"/>
+          </a:p>
+        </p:txBody>
+      </p:sp>
+      <p:sp>
+        <p:nvSpPr>
+          <p:cNvPr id="4" name="Номер слайда 3">
+            <a:extLst>
+              <a:ext uri="{FF2B5EF4-FFF2-40B4-BE49-F238E27FC236}">
+                <a16:creationId xmlns:a16="http://schemas.microsoft.com/office/drawing/2014/main" id="{DAE5EB51-86F9-BECC-D1C3-7F77A2A0EF33}"/>
+              </a:ext>
+            </a:extLst>
+          </p:cNvPr>
+          <p:cNvSpPr>
+            <a:spLocks noGrp="1"/>
+          </p:cNvSpPr>
+          <p:nvPr>
+            <p:ph type="sldNum" sz="quarter" idx="12"/>
+          </p:nvPr>
+        </p:nvSpPr>
+        <p:spPr/>
+        <p:txBody>
+          <a:bodyPr/>
+          <a:lstStyle/>
+          <a:p>
+            <a:fld id="{4B5110E4-62BB-43ED-9C58-95D1B7998FA6}" type="slidenum">
+              <a:rPr lang="ru-RU" smtClean="0"/>
+              <a:t>41</a:t>
+            </a:fld>
+            <a:endParaRPr lang="ru-RU"/>
+          </a:p>
+        </p:txBody>
+      </p:sp>
+      <p:pic>
+        <p:nvPicPr>
+          <p:cNvPr id="6" name="Рисунок 5">
+            <a:extLst>
+              <a:ext uri="{FF2B5EF4-FFF2-40B4-BE49-F238E27FC236}">
+                <a16:creationId xmlns:a16="http://schemas.microsoft.com/office/drawing/2014/main" id="{387B6E95-1178-0418-0C8B-7046E75FDCA0}"/>
+              </a:ext>
+            </a:extLst>
+          </p:cNvPr>
+          <p:cNvPicPr>
+            <a:picLocks noChangeAspect="1"/>
+          </p:cNvPicPr>
+          <p:nvPr/>
+        </p:nvPicPr>
+        <p:blipFill>
+          <a:blip r:embed="rId2"/>
+          <a:stretch>
+            <a:fillRect/>
+          </a:stretch>
+        </p:blipFill>
+        <p:spPr>
+          <a:xfrm>
+            <a:off x="1097821" y="2374556"/>
+            <a:ext cx="3076575" cy="609600"/>
+          </a:xfrm>
+          <a:prstGeom prst="rect">
+            <a:avLst/>
+          </a:prstGeom>
+        </p:spPr>
+      </p:pic>
+      <p:pic>
+        <p:nvPicPr>
+          <p:cNvPr id="8" name="Рисунок 7">
+            <a:extLst>
+              <a:ext uri="{FF2B5EF4-FFF2-40B4-BE49-F238E27FC236}">
+                <a16:creationId xmlns:a16="http://schemas.microsoft.com/office/drawing/2014/main" id="{9AA53FE3-B079-F1A9-F73B-62699FDC1E91}"/>
+              </a:ext>
+            </a:extLst>
+          </p:cNvPr>
+          <p:cNvPicPr>
+            <a:picLocks noChangeAspect="1"/>
+          </p:cNvPicPr>
+          <p:nvPr/>
+        </p:nvPicPr>
+        <p:blipFill>
+          <a:blip r:embed="rId3"/>
+          <a:stretch>
+            <a:fillRect/>
+          </a:stretch>
+        </p:blipFill>
+        <p:spPr>
+          <a:xfrm>
+            <a:off x="1097821" y="4001294"/>
+            <a:ext cx="2009775" cy="628650"/>
+          </a:xfrm>
+          <a:prstGeom prst="rect">
+            <a:avLst/>
+          </a:prstGeom>
+        </p:spPr>
+      </p:pic>
+      <p:pic>
+        <p:nvPicPr>
+          <p:cNvPr id="10" name="Рисунок 9">
+            <a:extLst>
+              <a:ext uri="{FF2B5EF4-FFF2-40B4-BE49-F238E27FC236}">
+                <a16:creationId xmlns:a16="http://schemas.microsoft.com/office/drawing/2014/main" id="{478797A6-45AC-390B-6F4D-772CDFCB5CE7}"/>
+              </a:ext>
+            </a:extLst>
+          </p:cNvPr>
+          <p:cNvPicPr>
+            <a:picLocks noChangeAspect="1"/>
+          </p:cNvPicPr>
+          <p:nvPr/>
+        </p:nvPicPr>
+        <p:blipFill>
+          <a:blip r:embed="rId4"/>
+          <a:stretch>
+            <a:fillRect/>
+          </a:stretch>
+        </p:blipFill>
+        <p:spPr>
+          <a:xfrm>
+            <a:off x="1097821" y="5485691"/>
+            <a:ext cx="1866900" cy="657225"/>
+          </a:xfrm>
+          <a:prstGeom prst="rect">
+            <a:avLst/>
+          </a:prstGeom>
+        </p:spPr>
+      </p:pic>
+      <p:sp>
+        <p:nvSpPr>
+          <p:cNvPr id="11" name="TextBox 10">
+            <a:extLst>
+              <a:ext uri="{FF2B5EF4-FFF2-40B4-BE49-F238E27FC236}">
+                <a16:creationId xmlns:a16="http://schemas.microsoft.com/office/drawing/2014/main" id="{89B4AF17-F961-CFB8-537A-9A3D3D4EA393}"/>
+              </a:ext>
+            </a:extLst>
+          </p:cNvPr>
+          <p:cNvSpPr txBox="1"/>
+          <p:nvPr/>
+        </p:nvSpPr>
+        <p:spPr>
+          <a:xfrm>
+            <a:off x="3873843" y="5153712"/>
+            <a:ext cx="6268995" cy="923330"/>
+          </a:xfrm>
+          <a:prstGeom prst="rect">
+            <a:avLst/>
+          </a:prstGeom>
+          <a:noFill/>
+        </p:spPr>
+        <p:txBody>
+          <a:bodyPr wrap="square" rtlCol="0">
+            <a:spAutoFit/>
+          </a:bodyPr>
+          <a:lstStyle/>
+          <a:p>
+            <a:r>
+              <a:rPr lang="ru-RU" b="0" i="0" dirty="0" err="1">
+                <a:solidFill>
+                  <a:srgbClr val="111111"/>
+                </a:solidFill>
+                <a:effectLst/>
+                <a:latin typeface="-apple-system"/>
+              </a:rPr>
+              <a:t>Recall</a:t>
+            </a:r>
+            <a:r>
+              <a:rPr lang="ru-RU" b="0" i="0" dirty="0">
+                <a:solidFill>
+                  <a:srgbClr val="111111"/>
+                </a:solidFill>
+                <a:effectLst/>
+                <a:latin typeface="-apple-system"/>
+              </a:rPr>
+              <a:t> демонстрирует способность алгоритма обнаруживать данный класс вообще, а </a:t>
+            </a:r>
+            <a:r>
+              <a:rPr lang="ru-RU" b="0" i="0" dirty="0" err="1">
+                <a:solidFill>
+                  <a:srgbClr val="111111"/>
+                </a:solidFill>
+                <a:effectLst/>
+                <a:latin typeface="-apple-system"/>
+              </a:rPr>
+              <a:t>precision</a:t>
+            </a:r>
+            <a:r>
+              <a:rPr lang="ru-RU" b="0" i="0" dirty="0">
+                <a:solidFill>
+                  <a:srgbClr val="111111"/>
+                </a:solidFill>
+                <a:effectLst/>
+                <a:latin typeface="-apple-system"/>
+              </a:rPr>
+              <a:t> — способность отличать этот класс от других классов.</a:t>
+            </a:r>
+            <a:endParaRPr lang="ru-RU" dirty="0"/>
+          </a:p>
+        </p:txBody>
+      </p:sp>
+      <p:pic>
+        <p:nvPicPr>
+          <p:cNvPr id="11266" name="Picture 2" descr="Стикер ВК Учебные будни #6">
+            <a:extLst>
+              <a:ext uri="{FF2B5EF4-FFF2-40B4-BE49-F238E27FC236}">
+                <a16:creationId xmlns:a16="http://schemas.microsoft.com/office/drawing/2014/main" id="{33295F22-E732-60B5-B1BC-F467DB2055AA}"/>
+              </a:ext>
+            </a:extLst>
+          </p:cNvPr>
+          <p:cNvPicPr>
+            <a:picLocks noChangeAspect="1" noChangeArrowheads="1"/>
+          </p:cNvPicPr>
+          <p:nvPr/>
+        </p:nvPicPr>
+        <p:blipFill>
+          <a:blip r:embed="rId5">
+            <a:extLst>
+              <a:ext uri="{28A0092B-C50C-407E-A947-70E740481C1C}">
+                <a14:useLocalDpi xmlns:a14="http://schemas.microsoft.com/office/drawing/2010/main" val="0"/>
+              </a:ext>
+            </a:extLst>
+          </a:blip>
+          <a:srcRect/>
+          <a:stretch>
+            <a:fillRect/>
+          </a:stretch>
+        </p:blipFill>
+        <p:spPr bwMode="auto">
+          <a:xfrm>
+            <a:off x="5113769" y="1988452"/>
+            <a:ext cx="3002433" cy="3002433"/>
+          </a:xfrm>
+          <a:prstGeom prst="rect">
+            <a:avLst/>
+          </a:prstGeom>
+          <a:noFill/>
+          <a:extLst>
+            <a:ext uri="{909E8E84-426E-40DD-AFC4-6F175D3DCCD1}">
+              <a14:hiddenFill xmlns:a14="http://schemas.microsoft.com/office/drawing/2010/main">
+                <a:solidFill>
+                  <a:srgbClr val="FFFFFF"/>
+                </a:solidFill>
+              </a14:hiddenFill>
+            </a:ext>
+          </a:extLst>
+        </p:spPr>
+      </p:pic>
+      <p:sp>
+        <p:nvSpPr>
+          <p:cNvPr id="12" name="TextBox 11">
+            <a:extLst>
+              <a:ext uri="{FF2B5EF4-FFF2-40B4-BE49-F238E27FC236}">
+                <a16:creationId xmlns:a16="http://schemas.microsoft.com/office/drawing/2014/main" id="{99577E76-C5DA-B4CF-CCA6-D78CF914E8D2}"/>
+              </a:ext>
+            </a:extLst>
+          </p:cNvPr>
+          <p:cNvSpPr txBox="1"/>
+          <p:nvPr/>
+        </p:nvSpPr>
+        <p:spPr>
+          <a:xfrm>
+            <a:off x="7927862" y="2276270"/>
+            <a:ext cx="3425938" cy="707886"/>
+          </a:xfrm>
+          <a:prstGeom prst="rect">
+            <a:avLst/>
+          </a:prstGeom>
+          <a:noFill/>
+        </p:spPr>
+        <p:txBody>
+          <a:bodyPr wrap="none" rtlCol="0">
+            <a:spAutoFit/>
+          </a:bodyPr>
+          <a:lstStyle/>
+          <a:p>
+            <a:r>
+              <a:rPr lang="ru-RU" sz="4000" dirty="0"/>
+              <a:t>Что выбрать?</a:t>
+            </a:r>
+          </a:p>
+        </p:txBody>
+      </p:sp>
+    </p:spTree>
+    <p:extLst>
+      <p:ext uri="{BB962C8B-B14F-4D97-AF65-F5344CB8AC3E}">
+        <p14:creationId xmlns:p14="http://schemas.microsoft.com/office/powerpoint/2010/main" val="3299654911"/>
+      </p:ext>
+    </p:extLst>
+  </p:cSld>
+  <p:clrMapOvr>
+    <a:masterClrMapping/>
+  </p:clrMapOvr>
+</p:sld>
+</file>
+
+<file path=ppt/slides/slide42.xml><?xml version="1.0" encoding="utf-8"?>
+<p:sld xmlns:a="http://schemas.openxmlformats.org/drawingml/2006/main" xmlns:r="http://schemas.openxmlformats.org/officeDocument/2006/relationships" xmlns:p="http://schemas.openxmlformats.org/presentationml/2006/main">
+  <p:cSld>
+    <p:spTree>
+      <p:nvGrpSpPr>
+        <p:cNvPr id="1" name=""/>
+        <p:cNvGrpSpPr/>
+        <p:nvPr/>
+      </p:nvGrpSpPr>
+      <p:grpSpPr>
+        <a:xfrm>
+          <a:off x="0" y="0"/>
+          <a:ext cx="0" cy="0"/>
+          <a:chOff x="0" y="0"/>
+          <a:chExt cx="0" cy="0"/>
+        </a:xfrm>
+      </p:grpSpPr>
+      <p:sp>
+        <p:nvSpPr>
+          <p:cNvPr id="2" name="Заголовок 1">
+            <a:extLst>
+              <a:ext uri="{FF2B5EF4-FFF2-40B4-BE49-F238E27FC236}">
+                <a16:creationId xmlns:a16="http://schemas.microsoft.com/office/drawing/2014/main" id="{B0BCA3F2-549B-BD15-79BA-381CBAD0C98B}"/>
+              </a:ext>
+            </a:extLst>
+          </p:cNvPr>
+          <p:cNvSpPr>
+            <a:spLocks noGrp="1"/>
+          </p:cNvSpPr>
+          <p:nvPr>
+            <p:ph type="title"/>
+          </p:nvPr>
+        </p:nvSpPr>
+        <p:spPr/>
+        <p:txBody>
+          <a:bodyPr/>
+          <a:lstStyle/>
+          <a:p>
+            <a:r>
+              <a:rPr lang="ru-RU" dirty="0"/>
+              <a:t>Метрики классификации</a:t>
+            </a:r>
+          </a:p>
+        </p:txBody>
+      </p:sp>
+      <p:sp>
+        <p:nvSpPr>
+          <p:cNvPr id="3" name="Объект 2">
+            <a:extLst>
+              <a:ext uri="{FF2B5EF4-FFF2-40B4-BE49-F238E27FC236}">
+                <a16:creationId xmlns:a16="http://schemas.microsoft.com/office/drawing/2014/main" id="{A50BEB20-A60E-1FEE-3163-89E5D254B768}"/>
+              </a:ext>
+            </a:extLst>
+          </p:cNvPr>
+          <p:cNvSpPr>
+            <a:spLocks noGrp="1"/>
+          </p:cNvSpPr>
+          <p:nvPr>
+            <p:ph idx="1"/>
+          </p:nvPr>
+        </p:nvSpPr>
+        <p:spPr>
+          <a:xfrm>
+            <a:off x="7306226" y="1825625"/>
+            <a:ext cx="4047573" cy="4351338"/>
+          </a:xfrm>
+        </p:spPr>
+        <p:txBody>
+          <a:bodyPr/>
+          <a:lstStyle/>
+          <a:p>
+            <a:pPr marL="0" indent="0">
+              <a:buNone/>
+            </a:pPr>
+            <a:endParaRPr lang="en-US" dirty="0"/>
+          </a:p>
+          <a:p>
+            <a:pPr marL="0" indent="0">
+              <a:buNone/>
+            </a:pPr>
+            <a:r>
+              <a:rPr lang="ru-RU" dirty="0"/>
+              <a:t>сколько выбранных элементов оказались правильными</a:t>
+            </a:r>
+          </a:p>
+          <a:p>
+            <a:pPr marL="0" indent="0">
+              <a:buNone/>
+            </a:pPr>
+            <a:endParaRPr lang="ru-RU" dirty="0"/>
+          </a:p>
+          <a:p>
+            <a:pPr marL="0" indent="0">
+              <a:buNone/>
+            </a:pPr>
+            <a:r>
+              <a:rPr lang="ru-RU" dirty="0"/>
+              <a:t>сколько правильных элементов оказались выбраны</a:t>
+            </a:r>
+          </a:p>
+        </p:txBody>
+      </p:sp>
+      <p:sp>
+        <p:nvSpPr>
+          <p:cNvPr id="4" name="Номер слайда 3">
+            <a:extLst>
+              <a:ext uri="{FF2B5EF4-FFF2-40B4-BE49-F238E27FC236}">
+                <a16:creationId xmlns:a16="http://schemas.microsoft.com/office/drawing/2014/main" id="{7101B1E4-F3B8-7FE8-9FA0-E50F14B5CD06}"/>
+              </a:ext>
+            </a:extLst>
+          </p:cNvPr>
+          <p:cNvSpPr>
+            <a:spLocks noGrp="1"/>
+          </p:cNvSpPr>
+          <p:nvPr>
+            <p:ph type="sldNum" sz="quarter" idx="12"/>
+          </p:nvPr>
+        </p:nvSpPr>
+        <p:spPr/>
+        <p:txBody>
+          <a:bodyPr/>
+          <a:lstStyle/>
+          <a:p>
+            <a:fld id="{4B5110E4-62BB-43ED-9C58-95D1B7998FA6}" type="slidenum">
+              <a:rPr lang="ru-RU" smtClean="0"/>
+              <a:t>42</a:t>
+            </a:fld>
+            <a:endParaRPr lang="ru-RU"/>
+          </a:p>
+        </p:txBody>
+      </p:sp>
+      <p:pic>
+        <p:nvPicPr>
+          <p:cNvPr id="10242" name="Picture 2" descr="Метрики в задачах машинного обучения / Хабр">
+            <a:extLst>
+              <a:ext uri="{FF2B5EF4-FFF2-40B4-BE49-F238E27FC236}">
+                <a16:creationId xmlns:a16="http://schemas.microsoft.com/office/drawing/2014/main" id="{E4AD3E2E-1B84-E283-3A04-EA0A7E9672A0}"/>
+              </a:ext>
+            </a:extLst>
+          </p:cNvPr>
+          <p:cNvPicPr>
+            <a:picLocks noChangeAspect="1" noChangeArrowheads="1"/>
+          </p:cNvPicPr>
+          <p:nvPr/>
+        </p:nvPicPr>
+        <p:blipFill rotWithShape="1">
+          <a:blip r:embed="rId2">
+            <a:extLst>
+              <a:ext uri="{28A0092B-C50C-407E-A947-70E740481C1C}">
+                <a14:useLocalDpi xmlns:a14="http://schemas.microsoft.com/office/drawing/2010/main" val="0"/>
+              </a:ext>
+            </a:extLst>
+          </a:blip>
+          <a:srcRect b="34356"/>
+          <a:stretch/>
+        </p:blipFill>
+        <p:spPr bwMode="auto">
+          <a:xfrm>
+            <a:off x="838200" y="1437942"/>
+            <a:ext cx="4047572" cy="4830860"/>
+          </a:xfrm>
+          <a:prstGeom prst="rect">
+            <a:avLst/>
+          </a:prstGeom>
+          <a:noFill/>
+          <a:extLst>
+            <a:ext uri="{909E8E84-426E-40DD-AFC4-6F175D3DCCD1}">
+              <a14:hiddenFill xmlns:a14="http://schemas.microsoft.com/office/drawing/2010/main">
+                <a:solidFill>
+                  <a:srgbClr val="FFFFFF"/>
+                </a:solidFill>
+              </a14:hiddenFill>
+            </a:ext>
+          </a:extLst>
+        </p:spPr>
+      </p:pic>
+      <p:pic>
+        <p:nvPicPr>
+          <p:cNvPr id="10244" name="Picture 4" descr="Метрики в задачах машинного обучения / Хабр">
+            <a:extLst>
+              <a:ext uri="{FF2B5EF4-FFF2-40B4-BE49-F238E27FC236}">
+                <a16:creationId xmlns:a16="http://schemas.microsoft.com/office/drawing/2014/main" id="{BDE3E8A1-AC53-A5C7-69F8-193305EF37C3}"/>
+              </a:ext>
+            </a:extLst>
+          </p:cNvPr>
+          <p:cNvPicPr>
+            <a:picLocks noChangeAspect="1" noChangeArrowheads="1"/>
+          </p:cNvPicPr>
+          <p:nvPr/>
+        </p:nvPicPr>
+        <p:blipFill rotWithShape="1">
+          <a:blip r:embed="rId2">
+            <a:extLst>
+              <a:ext uri="{28A0092B-C50C-407E-A947-70E740481C1C}">
+                <a14:useLocalDpi xmlns:a14="http://schemas.microsoft.com/office/drawing/2010/main" val="0"/>
+              </a:ext>
+            </a:extLst>
+          </a:blip>
+          <a:srcRect l="8747" t="77264" r="52874" b="7781"/>
+          <a:stretch/>
+        </p:blipFill>
+        <p:spPr bwMode="auto">
+          <a:xfrm>
+            <a:off x="5734496" y="2376568"/>
+            <a:ext cx="1571730" cy="1113505"/>
+          </a:xfrm>
+          <a:prstGeom prst="rect">
+            <a:avLst/>
+          </a:prstGeom>
+          <a:noFill/>
+          <a:extLst>
+            <a:ext uri="{909E8E84-426E-40DD-AFC4-6F175D3DCCD1}">
+              <a14:hiddenFill xmlns:a14="http://schemas.microsoft.com/office/drawing/2010/main">
+                <a:solidFill>
+                  <a:srgbClr val="FFFFFF"/>
+                </a:solidFill>
+              </a14:hiddenFill>
+            </a:ext>
+          </a:extLst>
+        </p:spPr>
+      </p:pic>
+      <p:pic>
+        <p:nvPicPr>
+          <p:cNvPr id="6" name="Рисунок 5">
+            <a:extLst>
+              <a:ext uri="{FF2B5EF4-FFF2-40B4-BE49-F238E27FC236}">
+                <a16:creationId xmlns:a16="http://schemas.microsoft.com/office/drawing/2014/main" id="{F4AB701D-98EF-95E4-1D4C-C6D048C9A01F}"/>
+              </a:ext>
+            </a:extLst>
+          </p:cNvPr>
+          <p:cNvPicPr>
+            <a:picLocks noChangeAspect="1"/>
+          </p:cNvPicPr>
+          <p:nvPr/>
+        </p:nvPicPr>
+        <p:blipFill>
+          <a:blip r:embed="rId3"/>
+          <a:stretch>
+            <a:fillRect/>
+          </a:stretch>
+        </p:blipFill>
+        <p:spPr>
+          <a:xfrm>
+            <a:off x="5903369" y="4215874"/>
+            <a:ext cx="1434527" cy="1235287"/>
+          </a:xfrm>
+          <a:prstGeom prst="rect">
+            <a:avLst/>
+          </a:prstGeom>
+        </p:spPr>
+      </p:pic>
+    </p:spTree>
+    <p:extLst>
+      <p:ext uri="{BB962C8B-B14F-4D97-AF65-F5344CB8AC3E}">
+        <p14:creationId xmlns:p14="http://schemas.microsoft.com/office/powerpoint/2010/main" val="3017721646"/>
+      </p:ext>
+    </p:extLst>
+  </p:cSld>
+  <p:clrMapOvr>
+    <a:masterClrMapping/>
+  </p:clrMapOvr>
+</p:sld>
+</file>
+
+<file path=ppt/slides/slide43.xml><?xml version="1.0" encoding="utf-8"?>
+<p:sld xmlns:a="http://schemas.openxmlformats.org/drawingml/2006/main" xmlns:r="http://schemas.openxmlformats.org/officeDocument/2006/relationships" xmlns:p="http://schemas.openxmlformats.org/presentationml/2006/main">
+  <p:cSld>
+    <p:spTree>
+      <p:nvGrpSpPr>
+        <p:cNvPr id="1" name=""/>
+        <p:cNvGrpSpPr/>
+        <p:nvPr/>
+      </p:nvGrpSpPr>
+      <p:grpSpPr>
+        <a:xfrm>
+          <a:off x="0" y="0"/>
+          <a:ext cx="0" cy="0"/>
+          <a:chOff x="0" y="0"/>
+          <a:chExt cx="0" cy="0"/>
+        </a:xfrm>
+      </p:grpSpPr>
+      <p:sp>
+        <p:nvSpPr>
+          <p:cNvPr id="2" name="Заголовок 1">
+            <a:extLst>
+              <a:ext uri="{FF2B5EF4-FFF2-40B4-BE49-F238E27FC236}">
+                <a16:creationId xmlns:a16="http://schemas.microsoft.com/office/drawing/2014/main" id="{0CF53415-8FC7-75A5-5FA0-A3A72109C6D2}"/>
+              </a:ext>
+            </a:extLst>
+          </p:cNvPr>
+          <p:cNvSpPr>
+            <a:spLocks noGrp="1"/>
+          </p:cNvSpPr>
+          <p:nvPr>
+            <p:ph type="title"/>
+          </p:nvPr>
+        </p:nvSpPr>
+        <p:spPr/>
+        <p:txBody>
+          <a:bodyPr/>
+          <a:lstStyle/>
+          <a:p>
+            <a:r>
+              <a:rPr lang="ru-RU" dirty="0"/>
+              <a:t>Метрики классификации</a:t>
+            </a:r>
+          </a:p>
+        </p:txBody>
+      </p:sp>
+      <p:sp>
+        <p:nvSpPr>
+          <p:cNvPr id="3" name="Объект 2">
+            <a:extLst>
+              <a:ext uri="{FF2B5EF4-FFF2-40B4-BE49-F238E27FC236}">
+                <a16:creationId xmlns:a16="http://schemas.microsoft.com/office/drawing/2014/main" id="{5351556A-4CB2-8621-C51A-F29AACD796CB}"/>
+              </a:ext>
+            </a:extLst>
+          </p:cNvPr>
+          <p:cNvSpPr>
+            <a:spLocks noGrp="1"/>
+          </p:cNvSpPr>
+          <p:nvPr>
+            <p:ph idx="1"/>
+          </p:nvPr>
+        </p:nvSpPr>
+        <p:spPr/>
+        <p:txBody>
+          <a:bodyPr/>
+          <a:lstStyle/>
+          <a:p>
+            <a:r>
+              <a:rPr lang="en-US" dirty="0"/>
+              <a:t>F-</a:t>
+            </a:r>
+            <a:r>
+              <a:rPr lang="ru-RU" dirty="0"/>
+              <a:t>мера </a:t>
+            </a:r>
+            <a:r>
+              <a:rPr lang="ru-RU" b="0" i="0" dirty="0">
+                <a:solidFill>
+                  <a:srgbClr val="111111"/>
+                </a:solidFill>
+                <a:effectLst/>
+                <a:latin typeface="-apple-system"/>
+              </a:rPr>
+              <a:t>— среднее гармоническое </a:t>
+            </a:r>
+            <a:r>
+              <a:rPr lang="ru-RU" b="0" i="0" dirty="0" err="1">
+                <a:solidFill>
+                  <a:srgbClr val="111111"/>
+                </a:solidFill>
+                <a:effectLst/>
+                <a:latin typeface="-apple-system"/>
+              </a:rPr>
+              <a:t>precision</a:t>
+            </a:r>
+            <a:r>
+              <a:rPr lang="ru-RU" b="0" i="0" dirty="0">
+                <a:solidFill>
+                  <a:srgbClr val="111111"/>
+                </a:solidFill>
+                <a:effectLst/>
+                <a:latin typeface="-apple-system"/>
+              </a:rPr>
+              <a:t> и </a:t>
+            </a:r>
+            <a:r>
+              <a:rPr lang="ru-RU" b="0" i="0" dirty="0" err="1">
+                <a:solidFill>
+                  <a:srgbClr val="111111"/>
+                </a:solidFill>
+                <a:effectLst/>
+                <a:latin typeface="-apple-system"/>
+              </a:rPr>
+              <a:t>recall</a:t>
+            </a:r>
+            <a:endParaRPr lang="ru-RU" dirty="0"/>
+          </a:p>
+        </p:txBody>
+      </p:sp>
+      <p:sp>
+        <p:nvSpPr>
+          <p:cNvPr id="4" name="Номер слайда 3">
+            <a:extLst>
+              <a:ext uri="{FF2B5EF4-FFF2-40B4-BE49-F238E27FC236}">
+                <a16:creationId xmlns:a16="http://schemas.microsoft.com/office/drawing/2014/main" id="{A503DC94-BA40-197C-F62D-52D70650DF6D}"/>
+              </a:ext>
+            </a:extLst>
+          </p:cNvPr>
+          <p:cNvSpPr>
+            <a:spLocks noGrp="1"/>
+          </p:cNvSpPr>
+          <p:nvPr>
+            <p:ph type="sldNum" sz="quarter" idx="12"/>
+          </p:nvPr>
+        </p:nvSpPr>
+        <p:spPr/>
+        <p:txBody>
+          <a:bodyPr/>
+          <a:lstStyle/>
+          <a:p>
+            <a:fld id="{4B5110E4-62BB-43ED-9C58-95D1B7998FA6}" type="slidenum">
+              <a:rPr lang="ru-RU" smtClean="0"/>
+              <a:t>43</a:t>
+            </a:fld>
+            <a:endParaRPr lang="ru-RU"/>
+          </a:p>
+        </p:txBody>
+      </p:sp>
+      <p:pic>
+        <p:nvPicPr>
+          <p:cNvPr id="6" name="Рисунок 5">
+            <a:extLst>
+              <a:ext uri="{FF2B5EF4-FFF2-40B4-BE49-F238E27FC236}">
+                <a16:creationId xmlns:a16="http://schemas.microsoft.com/office/drawing/2014/main" id="{71B7C43E-A34D-1118-B5A7-B6214122277A}"/>
+              </a:ext>
+            </a:extLst>
+          </p:cNvPr>
+          <p:cNvPicPr>
+            <a:picLocks noChangeAspect="1"/>
+          </p:cNvPicPr>
+          <p:nvPr/>
+        </p:nvPicPr>
+        <p:blipFill>
+          <a:blip r:embed="rId2"/>
+          <a:stretch>
+            <a:fillRect/>
+          </a:stretch>
+        </p:blipFill>
+        <p:spPr>
+          <a:xfrm>
+            <a:off x="1134762" y="2395409"/>
+            <a:ext cx="3409950" cy="666750"/>
+          </a:xfrm>
+          <a:prstGeom prst="rect">
+            <a:avLst/>
+          </a:prstGeom>
+        </p:spPr>
+      </p:pic>
+    </p:spTree>
+    <p:extLst>
+      <p:ext uri="{BB962C8B-B14F-4D97-AF65-F5344CB8AC3E}">
+        <p14:creationId xmlns:p14="http://schemas.microsoft.com/office/powerpoint/2010/main" val="2518450125"/>
       </p:ext>
     </p:extLst>
   </p:cSld>

</xml_diff>